<commit_message>
User account and profile picture
</commit_message>
<xml_diff>
--- a/Study/07. User Account and Profile Picture/User Account and Profile Picture.pptx
+++ b/Study/07. User Account and Profile Picture/User Account and Profile Picture.pptx
@@ -8,6 +8,9 @@
     <p:sldId id="256" r:id="rId2"/>
     <p:sldId id="284" r:id="rId3"/>
     <p:sldId id="293" r:id="rId4"/>
+    <p:sldId id="294" r:id="rId5"/>
+    <p:sldId id="295" r:id="rId6"/>
+    <p:sldId id="296" r:id="rId7"/>
   </p:sldIdLst>
   <p:sldSz cx="12192000" cy="6858000"/>
   <p:notesSz cx="6858000" cy="9144000"/>
@@ -836,7 +839,7 @@
           <a:p>
             <a:fld id="{B6FB7DCD-5BA3-48A2-BE8C-591555253DD2}" type="datetimeFigureOut">
               <a:rPr lang="ko-KR" altLang="en-US" smtClean="0"/>
-              <a:t>2020-06-28</a:t>
+              <a:t>2020-06-30</a:t>
             </a:fld>
             <a:endParaRPr lang="ko-KR" altLang="en-US"/>
           </a:p>
@@ -1087,7 +1090,7 @@
           <a:p>
             <a:fld id="{B6FB7DCD-5BA3-48A2-BE8C-591555253DD2}" type="datetimeFigureOut">
               <a:rPr lang="ko-KR" altLang="en-US" smtClean="0"/>
-              <a:t>2020-06-28</a:t>
+              <a:t>2020-06-30</a:t>
             </a:fld>
             <a:endParaRPr lang="ko-KR" altLang="en-US"/>
           </a:p>
@@ -1401,7 +1404,7 @@
           <a:p>
             <a:fld id="{B6FB7DCD-5BA3-48A2-BE8C-591555253DD2}" type="datetimeFigureOut">
               <a:rPr lang="ko-KR" altLang="en-US" smtClean="0"/>
-              <a:t>2020-06-28</a:t>
+              <a:t>2020-06-30</a:t>
             </a:fld>
             <a:endParaRPr lang="ko-KR" altLang="en-US"/>
           </a:p>
@@ -1742,7 +1745,7 @@
           <a:p>
             <a:fld id="{B6FB7DCD-5BA3-48A2-BE8C-591555253DD2}" type="datetimeFigureOut">
               <a:rPr lang="ko-KR" altLang="en-US" smtClean="0"/>
-              <a:t>2020-06-28</a:t>
+              <a:t>2020-06-30</a:t>
             </a:fld>
             <a:endParaRPr lang="ko-KR" altLang="en-US"/>
           </a:p>
@@ -2056,7 +2059,7 @@
           <a:p>
             <a:fld id="{B6FB7DCD-5BA3-48A2-BE8C-591555253DD2}" type="datetimeFigureOut">
               <a:rPr lang="ko-KR" altLang="en-US" smtClean="0"/>
-              <a:t>2020-06-28</a:t>
+              <a:t>2020-06-30</a:t>
             </a:fld>
             <a:endParaRPr lang="ko-KR" altLang="en-US"/>
           </a:p>
@@ -2449,7 +2452,7 @@
           <a:p>
             <a:fld id="{B6FB7DCD-5BA3-48A2-BE8C-591555253DD2}" type="datetimeFigureOut">
               <a:rPr lang="ko-KR" altLang="en-US" smtClean="0"/>
-              <a:t>2020-06-28</a:t>
+              <a:t>2020-06-30</a:t>
             </a:fld>
             <a:endParaRPr lang="ko-KR" altLang="en-US"/>
           </a:p>
@@ -2619,7 +2622,7 @@
           <a:p>
             <a:fld id="{B6FB7DCD-5BA3-48A2-BE8C-591555253DD2}" type="datetimeFigureOut">
               <a:rPr lang="ko-KR" altLang="en-US" smtClean="0"/>
-              <a:t>2020-06-28</a:t>
+              <a:t>2020-06-30</a:t>
             </a:fld>
             <a:endParaRPr lang="ko-KR" altLang="en-US"/>
           </a:p>
@@ -2799,7 +2802,7 @@
           <a:p>
             <a:fld id="{B6FB7DCD-5BA3-48A2-BE8C-591555253DD2}" type="datetimeFigureOut">
               <a:rPr lang="ko-KR" altLang="en-US" smtClean="0"/>
-              <a:t>2020-06-28</a:t>
+              <a:t>2020-06-30</a:t>
             </a:fld>
             <a:endParaRPr lang="ko-KR" altLang="en-US"/>
           </a:p>
@@ -2975,7 +2978,7 @@
           <a:p>
             <a:fld id="{B6FB7DCD-5BA3-48A2-BE8C-591555253DD2}" type="datetimeFigureOut">
               <a:rPr lang="ko-KR" altLang="en-US" smtClean="0"/>
-              <a:t>2020-06-28</a:t>
+              <a:t>2020-06-30</a:t>
             </a:fld>
             <a:endParaRPr lang="ko-KR" altLang="en-US"/>
           </a:p>
@@ -3222,7 +3225,7 @@
           <a:p>
             <a:fld id="{B6FB7DCD-5BA3-48A2-BE8C-591555253DD2}" type="datetimeFigureOut">
               <a:rPr lang="ko-KR" altLang="en-US" smtClean="0"/>
-              <a:t>2020-06-28</a:t>
+              <a:t>2020-06-30</a:t>
             </a:fld>
             <a:endParaRPr lang="ko-KR" altLang="en-US"/>
           </a:p>
@@ -3454,7 +3457,7 @@
           <a:p>
             <a:fld id="{B6FB7DCD-5BA3-48A2-BE8C-591555253DD2}" type="datetimeFigureOut">
               <a:rPr lang="ko-KR" altLang="en-US" smtClean="0"/>
-              <a:t>2020-06-28</a:t>
+              <a:t>2020-06-30</a:t>
             </a:fld>
             <a:endParaRPr lang="ko-KR" altLang="en-US"/>
           </a:p>
@@ -3828,7 +3831,7 @@
           <a:p>
             <a:fld id="{B6FB7DCD-5BA3-48A2-BE8C-591555253DD2}" type="datetimeFigureOut">
               <a:rPr lang="ko-KR" altLang="en-US" smtClean="0"/>
-              <a:t>2020-06-28</a:t>
+              <a:t>2020-06-30</a:t>
             </a:fld>
             <a:endParaRPr lang="ko-KR" altLang="en-US"/>
           </a:p>
@@ -3951,7 +3954,7 @@
           <a:p>
             <a:fld id="{B6FB7DCD-5BA3-48A2-BE8C-591555253DD2}" type="datetimeFigureOut">
               <a:rPr lang="ko-KR" altLang="en-US" smtClean="0"/>
-              <a:t>2020-06-28</a:t>
+              <a:t>2020-06-30</a:t>
             </a:fld>
             <a:endParaRPr lang="ko-KR" altLang="en-US"/>
           </a:p>
@@ -4046,7 +4049,7 @@
           <a:p>
             <a:fld id="{B6FB7DCD-5BA3-48A2-BE8C-591555253DD2}" type="datetimeFigureOut">
               <a:rPr lang="ko-KR" altLang="en-US" smtClean="0"/>
-              <a:t>2020-06-28</a:t>
+              <a:t>2020-06-30</a:t>
             </a:fld>
             <a:endParaRPr lang="ko-KR" altLang="en-US"/>
           </a:p>
@@ -4301,7 +4304,7 @@
           <a:p>
             <a:fld id="{B6FB7DCD-5BA3-48A2-BE8C-591555253DD2}" type="datetimeFigureOut">
               <a:rPr lang="ko-KR" altLang="en-US" smtClean="0"/>
-              <a:t>2020-06-28</a:t>
+              <a:t>2020-06-30</a:t>
             </a:fld>
             <a:endParaRPr lang="ko-KR" altLang="en-US"/>
           </a:p>
@@ -4564,7 +4567,7 @@
           <a:p>
             <a:fld id="{B6FB7DCD-5BA3-48A2-BE8C-591555253DD2}" type="datetimeFigureOut">
               <a:rPr lang="ko-KR" altLang="en-US" smtClean="0"/>
-              <a:t>2020-06-28</a:t>
+              <a:t>2020-06-30</a:t>
             </a:fld>
             <a:endParaRPr lang="ko-KR" altLang="en-US"/>
           </a:p>
@@ -5307,7 +5310,7 @@
           <a:p>
             <a:fld id="{B6FB7DCD-5BA3-48A2-BE8C-591555253DD2}" type="datetimeFigureOut">
               <a:rPr lang="ko-KR" altLang="en-US" smtClean="0"/>
-              <a:t>2020-06-28</a:t>
+              <a:t>2020-06-30</a:t>
             </a:fld>
             <a:endParaRPr lang="ko-KR" altLang="en-US"/>
           </a:p>
@@ -6134,70 +6137,934 @@
           </a:p>
         </p:txBody>
       </p:sp>
-      <p:pic>
-        <p:nvPicPr>
-          <p:cNvPr id="3" name="그림 2">
+      <p:sp>
+        <p:nvSpPr>
+          <p:cNvPr id="7" name="제목 1">
             <a:extLst>
               <a:ext uri="{FF2B5EF4-FFF2-40B4-BE49-F238E27FC236}">
-                <a16:creationId xmlns:a16="http://schemas.microsoft.com/office/drawing/2014/main" id="{45835982-CC71-4882-8F66-D840FCB8A134}"/>
+                <a16:creationId xmlns:a16="http://schemas.microsoft.com/office/drawing/2014/main" id="{453FF060-58F0-4366-9AA1-883792CE5955}"/>
               </a:ext>
             </a:extLst>
           </p:cNvPr>
-          <p:cNvPicPr>
-            <a:picLocks noChangeAspect="1"/>
-          </p:cNvPicPr>
+          <p:cNvSpPr txBox="1">
+            <a:spLocks/>
+          </p:cNvSpPr>
           <p:nvPr/>
-        </p:nvPicPr>
-        <p:blipFill>
-          <a:blip r:embed="rId2"/>
-          <a:stretch>
-            <a:fillRect/>
-          </a:stretch>
-        </p:blipFill>
+        </p:nvSpPr>
         <p:spPr>
           <a:xfrm>
-            <a:off x="773049" y="1487513"/>
-            <a:ext cx="4867954" cy="3591426"/>
+            <a:off x="1091421" y="1144214"/>
+            <a:ext cx="7768494" cy="517864"/>
           </a:xfrm>
           <a:prstGeom prst="rect">
             <a:avLst/>
           </a:prstGeom>
         </p:spPr>
-      </p:pic>
-      <p:pic>
-        <p:nvPicPr>
-          <p:cNvPr id="4" name="그림 3">
+        <p:txBody>
+          <a:bodyPr vert="horz" lIns="91440" tIns="45720" rIns="91440" bIns="45720" rtlCol="0" anchor="t">
+            <a:normAutofit fontScale="45000" lnSpcReduction="20000"/>
+          </a:bodyPr>
+          <a:lstStyle>
+            <a:lvl1pPr algn="l" defTabSz="457200" rtl="0" eaLnBrk="1" latinLnBrk="1" hangingPunct="1">
+              <a:spcBef>
+                <a:spcPct val="0"/>
+              </a:spcBef>
+              <a:buNone/>
+              <a:defRPr sz="3600" kern="1200">
+                <a:solidFill>
+                  <a:schemeClr val="accent1"/>
+                </a:solidFill>
+                <a:latin typeface="+mj-lt"/>
+                <a:ea typeface="+mj-ea"/>
+                <a:cs typeface="+mj-cs"/>
+              </a:defRPr>
+            </a:lvl1pPr>
+            <a:lvl2pPr eaLnBrk="1" latinLnBrk="1" hangingPunct="1">
+              <a:defRPr>
+                <a:solidFill>
+                  <a:schemeClr val="tx2"/>
+                </a:solidFill>
+              </a:defRPr>
+            </a:lvl2pPr>
+            <a:lvl3pPr eaLnBrk="1" latinLnBrk="1" hangingPunct="1">
+              <a:defRPr>
+                <a:solidFill>
+                  <a:schemeClr val="tx2"/>
+                </a:solidFill>
+              </a:defRPr>
+            </a:lvl3pPr>
+            <a:lvl4pPr eaLnBrk="1" latinLnBrk="1" hangingPunct="1">
+              <a:defRPr>
+                <a:solidFill>
+                  <a:schemeClr val="tx2"/>
+                </a:solidFill>
+              </a:defRPr>
+            </a:lvl4pPr>
+            <a:lvl5pPr eaLnBrk="1" latinLnBrk="1" hangingPunct="1">
+              <a:defRPr>
+                <a:solidFill>
+                  <a:schemeClr val="tx2"/>
+                </a:solidFill>
+              </a:defRPr>
+            </a:lvl5pPr>
+            <a:lvl6pPr eaLnBrk="1" latinLnBrk="1" hangingPunct="1">
+              <a:defRPr>
+                <a:solidFill>
+                  <a:schemeClr val="tx2"/>
+                </a:solidFill>
+              </a:defRPr>
+            </a:lvl6pPr>
+            <a:lvl7pPr eaLnBrk="1" latinLnBrk="1" hangingPunct="1">
+              <a:defRPr>
+                <a:solidFill>
+                  <a:schemeClr val="tx2"/>
+                </a:solidFill>
+              </a:defRPr>
+            </a:lvl7pPr>
+            <a:lvl8pPr eaLnBrk="1" latinLnBrk="1" hangingPunct="1">
+              <a:defRPr>
+                <a:solidFill>
+                  <a:schemeClr val="tx2"/>
+                </a:solidFill>
+              </a:defRPr>
+            </a:lvl8pPr>
+            <a:lvl9pPr eaLnBrk="1" latinLnBrk="1" hangingPunct="1">
+              <a:defRPr>
+                <a:solidFill>
+                  <a:schemeClr val="tx2"/>
+                </a:solidFill>
+              </a:defRPr>
+            </a:lvl9pPr>
+          </a:lstStyle>
+          <a:p>
+            <a:endParaRPr lang="en-US" altLang="ko-KR" dirty="0"/>
+          </a:p>
+          <a:p>
+            <a:r>
+              <a:rPr lang="en-US" altLang="ko-KR" dirty="0"/>
+              <a:t>forms.py</a:t>
+            </a:r>
+            <a:endParaRPr lang="ko-KR" altLang="en-US" dirty="0"/>
+          </a:p>
+        </p:txBody>
+      </p:sp>
+    </p:spTree>
+    <p:extLst>
+      <p:ext uri="{BB962C8B-B14F-4D97-AF65-F5344CB8AC3E}">
+        <p14:creationId xmlns:p14="http://schemas.microsoft.com/office/powerpoint/2010/main" val="1412398302"/>
+      </p:ext>
+    </p:extLst>
+  </p:cSld>
+  <p:clrMapOvr>
+    <a:masterClrMapping/>
+  </p:clrMapOvr>
+</p:sld>
+</file>
+
+<file path=ppt/slides/slide4.xml><?xml version="1.0" encoding="utf-8"?>
+<p:sld xmlns:a="http://schemas.openxmlformats.org/drawingml/2006/main" xmlns:r="http://schemas.openxmlformats.org/officeDocument/2006/relationships" xmlns:p="http://schemas.openxmlformats.org/presentationml/2006/main">
+  <p:cSld>
+    <p:spTree>
+      <p:nvGrpSpPr>
+        <p:cNvPr id="1" name=""/>
+        <p:cNvGrpSpPr/>
+        <p:nvPr/>
+      </p:nvGrpSpPr>
+      <p:grpSpPr>
+        <a:xfrm>
+          <a:off x="0" y="0"/>
+          <a:ext cx="0" cy="0"/>
+          <a:chOff x="0" y="0"/>
+          <a:chExt cx="0" cy="0"/>
+        </a:xfrm>
+      </p:grpSpPr>
+      <p:sp>
+        <p:nvSpPr>
+          <p:cNvPr id="2" name="제목 1">
             <a:extLst>
               <a:ext uri="{FF2B5EF4-FFF2-40B4-BE49-F238E27FC236}">
-                <a16:creationId xmlns:a16="http://schemas.microsoft.com/office/drawing/2014/main" id="{FDD61625-F51C-407F-A383-61651F42C14A}"/>
+                <a16:creationId xmlns:a16="http://schemas.microsoft.com/office/drawing/2014/main" id="{2EC833C6-FAC3-442B-803D-3FB02DF07980}"/>
               </a:ext>
             </a:extLst>
           </p:cNvPr>
-          <p:cNvPicPr>
-            <a:picLocks noChangeAspect="1"/>
-          </p:cNvPicPr>
-          <p:nvPr/>
-        </p:nvPicPr>
-        <p:blipFill>
-          <a:blip r:embed="rId3"/>
-          <a:stretch>
-            <a:fillRect/>
-          </a:stretch>
-        </p:blipFill>
+          <p:cNvSpPr>
+            <a:spLocks noGrp="1"/>
+          </p:cNvSpPr>
+          <p:nvPr>
+            <p:ph type="title"/>
+          </p:nvPr>
+        </p:nvSpPr>
         <p:spPr>
           <a:xfrm>
-            <a:off x="4400313" y="1476102"/>
-            <a:ext cx="3391373" cy="3905795"/>
+            <a:off x="677334" y="609600"/>
+            <a:ext cx="8596668" cy="517864"/>
+          </a:xfrm>
+        </p:spPr>
+        <p:txBody>
+          <a:bodyPr>
+            <a:normAutofit fontScale="90000"/>
+          </a:bodyPr>
+          <a:lstStyle/>
+          <a:p>
+            <a:r>
+              <a:rPr lang="en-US" altLang="ko-KR" dirty="0"/>
+              <a:t>7. User Account and Profile Picture</a:t>
+            </a:r>
+            <a:endParaRPr lang="ko-KR" altLang="en-US" dirty="0"/>
+          </a:p>
+        </p:txBody>
+      </p:sp>
+      <p:sp>
+        <p:nvSpPr>
+          <p:cNvPr id="6" name="직사각형 5">
+            <a:extLst>
+              <a:ext uri="{FF2B5EF4-FFF2-40B4-BE49-F238E27FC236}">
+                <a16:creationId xmlns:a16="http://schemas.microsoft.com/office/drawing/2014/main" id="{6A60F032-B172-43E0-B147-16329887DE8F}"/>
+              </a:ext>
+            </a:extLst>
+          </p:cNvPr>
+          <p:cNvSpPr/>
+          <p:nvPr/>
+        </p:nvSpPr>
+        <p:spPr>
+          <a:xfrm>
+            <a:off x="7620874" y="2196693"/>
+            <a:ext cx="4470512" cy="1384995"/>
           </a:xfrm>
           <a:prstGeom prst="rect">
             <a:avLst/>
           </a:prstGeom>
         </p:spPr>
-      </p:pic>
+        <p:txBody>
+          <a:bodyPr wrap="square">
+            <a:spAutoFit/>
+          </a:bodyPr>
+          <a:lstStyle/>
+          <a:p>
+            <a:pPr marL="285750" indent="-285750">
+              <a:buFontTx/>
+              <a:buChar char="-"/>
+            </a:pPr>
+            <a:r>
+              <a:rPr lang="en-US" altLang="ko-KR" sz="1400" dirty="0" err="1"/>
+              <a:t>WTForms</a:t>
+            </a:r>
+            <a:r>
+              <a:rPr lang="ko-KR" altLang="en-US" sz="1400" dirty="0"/>
+              <a:t>로 작업할 때 </a:t>
+            </a:r>
+            <a:r>
+              <a:rPr lang="en-US" altLang="ko-KR" sz="1400" dirty="0"/>
+              <a:t>class</a:t>
+            </a:r>
+            <a:r>
+              <a:rPr lang="ko-KR" altLang="en-US" sz="1400" dirty="0"/>
+              <a:t>로 먼저 그 </a:t>
+            </a:r>
+            <a:r>
+              <a:rPr lang="en-US" altLang="ko-KR" sz="1400" dirty="0"/>
+              <a:t>forms</a:t>
+            </a:r>
+            <a:r>
+              <a:rPr lang="ko-KR" altLang="en-US" sz="1400" dirty="0"/>
+              <a:t>을 정의 </a:t>
+            </a:r>
+            <a:r>
+              <a:rPr lang="ko-KR" altLang="en-US" sz="1400" dirty="0" err="1"/>
+              <a:t>해야한다</a:t>
+            </a:r>
+            <a:r>
+              <a:rPr lang="en-US" altLang="ko-KR" sz="1400" dirty="0"/>
+              <a:t>.</a:t>
+            </a:r>
+          </a:p>
+          <a:p>
+            <a:pPr marL="285750" indent="-285750">
+              <a:buFontTx/>
+              <a:buChar char="-"/>
+            </a:pPr>
+            <a:r>
+              <a:rPr lang="ko-KR" altLang="en-US" sz="1400" dirty="0"/>
+              <a:t>어플리케이션을 여러 모듈로 쪼개고 </a:t>
+            </a:r>
+            <a:r>
+              <a:rPr lang="en-US" altLang="ko-KR" sz="1400" dirty="0"/>
+              <a:t>form</a:t>
+            </a:r>
+            <a:r>
+              <a:rPr lang="ko-KR" altLang="en-US" sz="1400" dirty="0"/>
+              <a:t>에 대한 분리된 모듈을 추가하는 것이 권고된다</a:t>
+            </a:r>
+            <a:r>
+              <a:rPr lang="en-US" altLang="ko-KR" sz="1400" dirty="0"/>
+              <a:t>.</a:t>
+            </a:r>
+          </a:p>
+          <a:p>
+            <a:endParaRPr lang="en-US" altLang="ko-KR" sz="1400" dirty="0"/>
+          </a:p>
+          <a:p>
+            <a:endParaRPr lang="en-US" altLang="ko-KR" sz="1400" dirty="0"/>
+          </a:p>
+        </p:txBody>
+      </p:sp>
+      <p:sp>
+        <p:nvSpPr>
+          <p:cNvPr id="7" name="제목 1">
+            <a:extLst>
+              <a:ext uri="{FF2B5EF4-FFF2-40B4-BE49-F238E27FC236}">
+                <a16:creationId xmlns:a16="http://schemas.microsoft.com/office/drawing/2014/main" id="{453FF060-58F0-4366-9AA1-883792CE5955}"/>
+              </a:ext>
+            </a:extLst>
+          </p:cNvPr>
+          <p:cNvSpPr txBox="1">
+            <a:spLocks/>
+          </p:cNvSpPr>
+          <p:nvPr/>
+        </p:nvSpPr>
+        <p:spPr>
+          <a:xfrm>
+            <a:off x="1091421" y="1144214"/>
+            <a:ext cx="7768494" cy="517864"/>
+          </a:xfrm>
+          <a:prstGeom prst="rect">
+            <a:avLst/>
+          </a:prstGeom>
+        </p:spPr>
+        <p:txBody>
+          <a:bodyPr vert="horz" lIns="91440" tIns="45720" rIns="91440" bIns="45720" rtlCol="0" anchor="t">
+            <a:normAutofit fontScale="45000" lnSpcReduction="20000"/>
+          </a:bodyPr>
+          <a:lstStyle>
+            <a:lvl1pPr algn="l" defTabSz="457200" rtl="0" eaLnBrk="1" latinLnBrk="1" hangingPunct="1">
+              <a:spcBef>
+                <a:spcPct val="0"/>
+              </a:spcBef>
+              <a:buNone/>
+              <a:defRPr sz="3600" kern="1200">
+                <a:solidFill>
+                  <a:schemeClr val="accent1"/>
+                </a:solidFill>
+                <a:latin typeface="+mj-lt"/>
+                <a:ea typeface="+mj-ea"/>
+                <a:cs typeface="+mj-cs"/>
+              </a:defRPr>
+            </a:lvl1pPr>
+            <a:lvl2pPr eaLnBrk="1" latinLnBrk="1" hangingPunct="1">
+              <a:defRPr>
+                <a:solidFill>
+                  <a:schemeClr val="tx2"/>
+                </a:solidFill>
+              </a:defRPr>
+            </a:lvl2pPr>
+            <a:lvl3pPr eaLnBrk="1" latinLnBrk="1" hangingPunct="1">
+              <a:defRPr>
+                <a:solidFill>
+                  <a:schemeClr val="tx2"/>
+                </a:solidFill>
+              </a:defRPr>
+            </a:lvl3pPr>
+            <a:lvl4pPr eaLnBrk="1" latinLnBrk="1" hangingPunct="1">
+              <a:defRPr>
+                <a:solidFill>
+                  <a:schemeClr val="tx2"/>
+                </a:solidFill>
+              </a:defRPr>
+            </a:lvl4pPr>
+            <a:lvl5pPr eaLnBrk="1" latinLnBrk="1" hangingPunct="1">
+              <a:defRPr>
+                <a:solidFill>
+                  <a:schemeClr val="tx2"/>
+                </a:solidFill>
+              </a:defRPr>
+            </a:lvl5pPr>
+            <a:lvl6pPr eaLnBrk="1" latinLnBrk="1" hangingPunct="1">
+              <a:defRPr>
+                <a:solidFill>
+                  <a:schemeClr val="tx2"/>
+                </a:solidFill>
+              </a:defRPr>
+            </a:lvl6pPr>
+            <a:lvl7pPr eaLnBrk="1" latinLnBrk="1" hangingPunct="1">
+              <a:defRPr>
+                <a:solidFill>
+                  <a:schemeClr val="tx2"/>
+                </a:solidFill>
+              </a:defRPr>
+            </a:lvl7pPr>
+            <a:lvl8pPr eaLnBrk="1" latinLnBrk="1" hangingPunct="1">
+              <a:defRPr>
+                <a:solidFill>
+                  <a:schemeClr val="tx2"/>
+                </a:solidFill>
+              </a:defRPr>
+            </a:lvl8pPr>
+            <a:lvl9pPr eaLnBrk="1" latinLnBrk="1" hangingPunct="1">
+              <a:defRPr>
+                <a:solidFill>
+                  <a:schemeClr val="tx2"/>
+                </a:solidFill>
+              </a:defRPr>
+            </a:lvl9pPr>
+          </a:lstStyle>
+          <a:p>
+            <a:endParaRPr lang="en-US" altLang="ko-KR" dirty="0"/>
+          </a:p>
+          <a:p>
+            <a:r>
+              <a:rPr lang="en-US" altLang="ko-KR" dirty="0"/>
+              <a:t>routes.py</a:t>
+            </a:r>
+            <a:endParaRPr lang="ko-KR" altLang="en-US" dirty="0"/>
+          </a:p>
+        </p:txBody>
+      </p:sp>
     </p:spTree>
     <p:extLst>
       <p:ext uri="{BB962C8B-B14F-4D97-AF65-F5344CB8AC3E}">
-        <p14:creationId xmlns:p14="http://schemas.microsoft.com/office/powerpoint/2010/main" val="1412398302"/>
+        <p14:creationId xmlns:p14="http://schemas.microsoft.com/office/powerpoint/2010/main" val="563935502"/>
+      </p:ext>
+    </p:extLst>
+  </p:cSld>
+  <p:clrMapOvr>
+    <a:masterClrMapping/>
+  </p:clrMapOvr>
+</p:sld>
+</file>
+
+<file path=ppt/slides/slide5.xml><?xml version="1.0" encoding="utf-8"?>
+<p:sld xmlns:a="http://schemas.openxmlformats.org/drawingml/2006/main" xmlns:r="http://schemas.openxmlformats.org/officeDocument/2006/relationships" xmlns:p="http://schemas.openxmlformats.org/presentationml/2006/main">
+  <p:cSld>
+    <p:spTree>
+      <p:nvGrpSpPr>
+        <p:cNvPr id="1" name=""/>
+        <p:cNvGrpSpPr/>
+        <p:nvPr/>
+      </p:nvGrpSpPr>
+      <p:grpSpPr>
+        <a:xfrm>
+          <a:off x="0" y="0"/>
+          <a:ext cx="0" cy="0"/>
+          <a:chOff x="0" y="0"/>
+          <a:chExt cx="0" cy="0"/>
+        </a:xfrm>
+      </p:grpSpPr>
+      <p:sp>
+        <p:nvSpPr>
+          <p:cNvPr id="2" name="제목 1">
+            <a:extLst>
+              <a:ext uri="{FF2B5EF4-FFF2-40B4-BE49-F238E27FC236}">
+                <a16:creationId xmlns:a16="http://schemas.microsoft.com/office/drawing/2014/main" id="{2EC833C6-FAC3-442B-803D-3FB02DF07980}"/>
+              </a:ext>
+            </a:extLst>
+          </p:cNvPr>
+          <p:cNvSpPr>
+            <a:spLocks noGrp="1"/>
+          </p:cNvSpPr>
+          <p:nvPr>
+            <p:ph type="title"/>
+          </p:nvPr>
+        </p:nvSpPr>
+        <p:spPr>
+          <a:xfrm>
+            <a:off x="677334" y="609600"/>
+            <a:ext cx="8596668" cy="517864"/>
+          </a:xfrm>
+        </p:spPr>
+        <p:txBody>
+          <a:bodyPr>
+            <a:normAutofit fontScale="90000"/>
+          </a:bodyPr>
+          <a:lstStyle/>
+          <a:p>
+            <a:r>
+              <a:rPr lang="en-US" altLang="ko-KR" dirty="0"/>
+              <a:t>7. User Account and Profile Picture</a:t>
+            </a:r>
+            <a:endParaRPr lang="ko-KR" altLang="en-US" dirty="0"/>
+          </a:p>
+        </p:txBody>
+      </p:sp>
+      <p:sp>
+        <p:nvSpPr>
+          <p:cNvPr id="6" name="직사각형 5">
+            <a:extLst>
+              <a:ext uri="{FF2B5EF4-FFF2-40B4-BE49-F238E27FC236}">
+                <a16:creationId xmlns:a16="http://schemas.microsoft.com/office/drawing/2014/main" id="{6A60F032-B172-43E0-B147-16329887DE8F}"/>
+              </a:ext>
+            </a:extLst>
+          </p:cNvPr>
+          <p:cNvSpPr/>
+          <p:nvPr/>
+        </p:nvSpPr>
+        <p:spPr>
+          <a:xfrm>
+            <a:off x="7620874" y="2196693"/>
+            <a:ext cx="4470512" cy="1384995"/>
+          </a:xfrm>
+          <a:prstGeom prst="rect">
+            <a:avLst/>
+          </a:prstGeom>
+        </p:spPr>
+        <p:txBody>
+          <a:bodyPr wrap="square">
+            <a:spAutoFit/>
+          </a:bodyPr>
+          <a:lstStyle/>
+          <a:p>
+            <a:pPr marL="285750" indent="-285750">
+              <a:buFontTx/>
+              <a:buChar char="-"/>
+            </a:pPr>
+            <a:r>
+              <a:rPr lang="en-US" altLang="ko-KR" sz="1400" dirty="0" err="1"/>
+              <a:t>WTForms</a:t>
+            </a:r>
+            <a:r>
+              <a:rPr lang="ko-KR" altLang="en-US" sz="1400" dirty="0"/>
+              <a:t>로 작업할 때 </a:t>
+            </a:r>
+            <a:r>
+              <a:rPr lang="en-US" altLang="ko-KR" sz="1400" dirty="0"/>
+              <a:t>class</a:t>
+            </a:r>
+            <a:r>
+              <a:rPr lang="ko-KR" altLang="en-US" sz="1400" dirty="0"/>
+              <a:t>로 먼저 그 </a:t>
+            </a:r>
+            <a:r>
+              <a:rPr lang="en-US" altLang="ko-KR" sz="1400" dirty="0"/>
+              <a:t>forms</a:t>
+            </a:r>
+            <a:r>
+              <a:rPr lang="ko-KR" altLang="en-US" sz="1400" dirty="0"/>
+              <a:t>을 정의 </a:t>
+            </a:r>
+            <a:r>
+              <a:rPr lang="ko-KR" altLang="en-US" sz="1400" dirty="0" err="1"/>
+              <a:t>해야한다</a:t>
+            </a:r>
+            <a:r>
+              <a:rPr lang="en-US" altLang="ko-KR" sz="1400" dirty="0"/>
+              <a:t>.</a:t>
+            </a:r>
+          </a:p>
+          <a:p>
+            <a:pPr marL="285750" indent="-285750">
+              <a:buFontTx/>
+              <a:buChar char="-"/>
+            </a:pPr>
+            <a:r>
+              <a:rPr lang="ko-KR" altLang="en-US" sz="1400" dirty="0"/>
+              <a:t>어플리케이션을 여러 모듈로 쪼개고 </a:t>
+            </a:r>
+            <a:r>
+              <a:rPr lang="en-US" altLang="ko-KR" sz="1400" dirty="0"/>
+              <a:t>form</a:t>
+            </a:r>
+            <a:r>
+              <a:rPr lang="ko-KR" altLang="en-US" sz="1400" dirty="0"/>
+              <a:t>에 대한 분리된 모듈을 추가하는 것이 권고된다</a:t>
+            </a:r>
+            <a:r>
+              <a:rPr lang="en-US" altLang="ko-KR" sz="1400" dirty="0"/>
+              <a:t>.</a:t>
+            </a:r>
+          </a:p>
+          <a:p>
+            <a:endParaRPr lang="en-US" altLang="ko-KR" sz="1400" dirty="0"/>
+          </a:p>
+          <a:p>
+            <a:endParaRPr lang="en-US" altLang="ko-KR" sz="1400" dirty="0"/>
+          </a:p>
+        </p:txBody>
+      </p:sp>
+      <p:sp>
+        <p:nvSpPr>
+          <p:cNvPr id="7" name="제목 1">
+            <a:extLst>
+              <a:ext uri="{FF2B5EF4-FFF2-40B4-BE49-F238E27FC236}">
+                <a16:creationId xmlns:a16="http://schemas.microsoft.com/office/drawing/2014/main" id="{453FF060-58F0-4366-9AA1-883792CE5955}"/>
+              </a:ext>
+            </a:extLst>
+          </p:cNvPr>
+          <p:cNvSpPr txBox="1">
+            <a:spLocks/>
+          </p:cNvSpPr>
+          <p:nvPr/>
+        </p:nvSpPr>
+        <p:spPr>
+          <a:xfrm>
+            <a:off x="1109177" y="1144214"/>
+            <a:ext cx="7768494" cy="517864"/>
+          </a:xfrm>
+          <a:prstGeom prst="rect">
+            <a:avLst/>
+          </a:prstGeom>
+        </p:spPr>
+        <p:txBody>
+          <a:bodyPr vert="horz" lIns="91440" tIns="45720" rIns="91440" bIns="45720" rtlCol="0" anchor="t">
+            <a:normAutofit fontScale="45000" lnSpcReduction="20000"/>
+          </a:bodyPr>
+          <a:lstStyle>
+            <a:lvl1pPr algn="l" defTabSz="457200" rtl="0" eaLnBrk="1" latinLnBrk="1" hangingPunct="1">
+              <a:spcBef>
+                <a:spcPct val="0"/>
+              </a:spcBef>
+              <a:buNone/>
+              <a:defRPr sz="3600" kern="1200">
+                <a:solidFill>
+                  <a:schemeClr val="accent1"/>
+                </a:solidFill>
+                <a:latin typeface="+mj-lt"/>
+                <a:ea typeface="+mj-ea"/>
+                <a:cs typeface="+mj-cs"/>
+              </a:defRPr>
+            </a:lvl1pPr>
+            <a:lvl2pPr eaLnBrk="1" latinLnBrk="1" hangingPunct="1">
+              <a:defRPr>
+                <a:solidFill>
+                  <a:schemeClr val="tx2"/>
+                </a:solidFill>
+              </a:defRPr>
+            </a:lvl2pPr>
+            <a:lvl3pPr eaLnBrk="1" latinLnBrk="1" hangingPunct="1">
+              <a:defRPr>
+                <a:solidFill>
+                  <a:schemeClr val="tx2"/>
+                </a:solidFill>
+              </a:defRPr>
+            </a:lvl3pPr>
+            <a:lvl4pPr eaLnBrk="1" latinLnBrk="1" hangingPunct="1">
+              <a:defRPr>
+                <a:solidFill>
+                  <a:schemeClr val="tx2"/>
+                </a:solidFill>
+              </a:defRPr>
+            </a:lvl4pPr>
+            <a:lvl5pPr eaLnBrk="1" latinLnBrk="1" hangingPunct="1">
+              <a:defRPr>
+                <a:solidFill>
+                  <a:schemeClr val="tx2"/>
+                </a:solidFill>
+              </a:defRPr>
+            </a:lvl5pPr>
+            <a:lvl6pPr eaLnBrk="1" latinLnBrk="1" hangingPunct="1">
+              <a:defRPr>
+                <a:solidFill>
+                  <a:schemeClr val="tx2"/>
+                </a:solidFill>
+              </a:defRPr>
+            </a:lvl6pPr>
+            <a:lvl7pPr eaLnBrk="1" latinLnBrk="1" hangingPunct="1">
+              <a:defRPr>
+                <a:solidFill>
+                  <a:schemeClr val="tx2"/>
+                </a:solidFill>
+              </a:defRPr>
+            </a:lvl7pPr>
+            <a:lvl8pPr eaLnBrk="1" latinLnBrk="1" hangingPunct="1">
+              <a:defRPr>
+                <a:solidFill>
+                  <a:schemeClr val="tx2"/>
+                </a:solidFill>
+              </a:defRPr>
+            </a:lvl8pPr>
+            <a:lvl9pPr eaLnBrk="1" latinLnBrk="1" hangingPunct="1">
+              <a:defRPr>
+                <a:solidFill>
+                  <a:schemeClr val="tx2"/>
+                </a:solidFill>
+              </a:defRPr>
+            </a:lvl9pPr>
+          </a:lstStyle>
+          <a:p>
+            <a:endParaRPr lang="en-US" altLang="ko-KR" dirty="0"/>
+          </a:p>
+          <a:p>
+            <a:r>
+              <a:rPr lang="en-US" altLang="ko-KR" dirty="0" err="1"/>
+              <a:t>account.htlm</a:t>
+            </a:r>
+            <a:endParaRPr lang="ko-KR" altLang="en-US" dirty="0"/>
+          </a:p>
+        </p:txBody>
+      </p:sp>
+    </p:spTree>
+    <p:extLst>
+      <p:ext uri="{BB962C8B-B14F-4D97-AF65-F5344CB8AC3E}">
+        <p14:creationId xmlns:p14="http://schemas.microsoft.com/office/powerpoint/2010/main" val="1016715967"/>
+      </p:ext>
+    </p:extLst>
+  </p:cSld>
+  <p:clrMapOvr>
+    <a:masterClrMapping/>
+  </p:clrMapOvr>
+</p:sld>
+</file>
+
+<file path=ppt/slides/slide6.xml><?xml version="1.0" encoding="utf-8"?>
+<p:sld xmlns:a="http://schemas.openxmlformats.org/drawingml/2006/main" xmlns:r="http://schemas.openxmlformats.org/officeDocument/2006/relationships" xmlns:p="http://schemas.openxmlformats.org/presentationml/2006/main">
+  <p:cSld>
+    <p:spTree>
+      <p:nvGrpSpPr>
+        <p:cNvPr id="1" name=""/>
+        <p:cNvGrpSpPr/>
+        <p:nvPr/>
+      </p:nvGrpSpPr>
+      <p:grpSpPr>
+        <a:xfrm>
+          <a:off x="0" y="0"/>
+          <a:ext cx="0" cy="0"/>
+          <a:chOff x="0" y="0"/>
+          <a:chExt cx="0" cy="0"/>
+        </a:xfrm>
+      </p:grpSpPr>
+      <p:sp>
+        <p:nvSpPr>
+          <p:cNvPr id="2" name="제목 1">
+            <a:extLst>
+              <a:ext uri="{FF2B5EF4-FFF2-40B4-BE49-F238E27FC236}">
+                <a16:creationId xmlns:a16="http://schemas.microsoft.com/office/drawing/2014/main" id="{2EC833C6-FAC3-442B-803D-3FB02DF07980}"/>
+              </a:ext>
+            </a:extLst>
+          </p:cNvPr>
+          <p:cNvSpPr>
+            <a:spLocks noGrp="1"/>
+          </p:cNvSpPr>
+          <p:nvPr>
+            <p:ph type="title"/>
+          </p:nvPr>
+        </p:nvSpPr>
+        <p:spPr>
+          <a:xfrm>
+            <a:off x="677334" y="609600"/>
+            <a:ext cx="8596668" cy="517864"/>
+          </a:xfrm>
+        </p:spPr>
+        <p:txBody>
+          <a:bodyPr>
+            <a:normAutofit fontScale="90000"/>
+          </a:bodyPr>
+          <a:lstStyle/>
+          <a:p>
+            <a:r>
+              <a:rPr lang="en-US" altLang="ko-KR" dirty="0"/>
+              <a:t>7. User Account and Profile Picture</a:t>
+            </a:r>
+            <a:endParaRPr lang="ko-KR" altLang="en-US" dirty="0"/>
+          </a:p>
+        </p:txBody>
+      </p:sp>
+      <p:sp>
+        <p:nvSpPr>
+          <p:cNvPr id="6" name="직사각형 5">
+            <a:extLst>
+              <a:ext uri="{FF2B5EF4-FFF2-40B4-BE49-F238E27FC236}">
+                <a16:creationId xmlns:a16="http://schemas.microsoft.com/office/drawing/2014/main" id="{6A60F032-B172-43E0-B147-16329887DE8F}"/>
+              </a:ext>
+            </a:extLst>
+          </p:cNvPr>
+          <p:cNvSpPr/>
+          <p:nvPr/>
+        </p:nvSpPr>
+        <p:spPr>
+          <a:xfrm>
+            <a:off x="7620874" y="2196693"/>
+            <a:ext cx="4470512" cy="1384995"/>
+          </a:xfrm>
+          <a:prstGeom prst="rect">
+            <a:avLst/>
+          </a:prstGeom>
+        </p:spPr>
+        <p:txBody>
+          <a:bodyPr wrap="square">
+            <a:spAutoFit/>
+          </a:bodyPr>
+          <a:lstStyle/>
+          <a:p>
+            <a:pPr marL="285750" indent="-285750">
+              <a:buFontTx/>
+              <a:buChar char="-"/>
+            </a:pPr>
+            <a:r>
+              <a:rPr lang="en-US" altLang="ko-KR" sz="1400" dirty="0" err="1"/>
+              <a:t>WTForms</a:t>
+            </a:r>
+            <a:r>
+              <a:rPr lang="ko-KR" altLang="en-US" sz="1400" dirty="0"/>
+              <a:t>로 작업할 때 </a:t>
+            </a:r>
+            <a:r>
+              <a:rPr lang="en-US" altLang="ko-KR" sz="1400" dirty="0"/>
+              <a:t>class</a:t>
+            </a:r>
+            <a:r>
+              <a:rPr lang="ko-KR" altLang="en-US" sz="1400" dirty="0"/>
+              <a:t>로 먼저 그 </a:t>
+            </a:r>
+            <a:r>
+              <a:rPr lang="en-US" altLang="ko-KR" sz="1400" dirty="0"/>
+              <a:t>forms</a:t>
+            </a:r>
+            <a:r>
+              <a:rPr lang="ko-KR" altLang="en-US" sz="1400" dirty="0"/>
+              <a:t>을 정의 </a:t>
+            </a:r>
+            <a:r>
+              <a:rPr lang="ko-KR" altLang="en-US" sz="1400" dirty="0" err="1"/>
+              <a:t>해야한다</a:t>
+            </a:r>
+            <a:r>
+              <a:rPr lang="en-US" altLang="ko-KR" sz="1400" dirty="0"/>
+              <a:t>.</a:t>
+            </a:r>
+          </a:p>
+          <a:p>
+            <a:pPr marL="285750" indent="-285750">
+              <a:buFontTx/>
+              <a:buChar char="-"/>
+            </a:pPr>
+            <a:r>
+              <a:rPr lang="ko-KR" altLang="en-US" sz="1400" dirty="0"/>
+              <a:t>어플리케이션을 여러 모듈로 쪼개고 </a:t>
+            </a:r>
+            <a:r>
+              <a:rPr lang="en-US" altLang="ko-KR" sz="1400" dirty="0"/>
+              <a:t>form</a:t>
+            </a:r>
+            <a:r>
+              <a:rPr lang="ko-KR" altLang="en-US" sz="1400" dirty="0"/>
+              <a:t>에 대한 분리된 모듈을 추가하는 것이 권고된다</a:t>
+            </a:r>
+            <a:r>
+              <a:rPr lang="en-US" altLang="ko-KR" sz="1400" dirty="0"/>
+              <a:t>.</a:t>
+            </a:r>
+          </a:p>
+          <a:p>
+            <a:endParaRPr lang="en-US" altLang="ko-KR" sz="1400" dirty="0"/>
+          </a:p>
+          <a:p>
+            <a:endParaRPr lang="en-US" altLang="ko-KR" sz="1400" dirty="0"/>
+          </a:p>
+        </p:txBody>
+      </p:sp>
+      <p:sp>
+        <p:nvSpPr>
+          <p:cNvPr id="7" name="제목 1">
+            <a:extLst>
+              <a:ext uri="{FF2B5EF4-FFF2-40B4-BE49-F238E27FC236}">
+                <a16:creationId xmlns:a16="http://schemas.microsoft.com/office/drawing/2014/main" id="{453FF060-58F0-4366-9AA1-883792CE5955}"/>
+              </a:ext>
+            </a:extLst>
+          </p:cNvPr>
+          <p:cNvSpPr txBox="1">
+            <a:spLocks/>
+          </p:cNvSpPr>
+          <p:nvPr/>
+        </p:nvSpPr>
+        <p:spPr>
+          <a:xfrm>
+            <a:off x="1109177" y="1144214"/>
+            <a:ext cx="7768494" cy="517864"/>
+          </a:xfrm>
+          <a:prstGeom prst="rect">
+            <a:avLst/>
+          </a:prstGeom>
+        </p:spPr>
+        <p:txBody>
+          <a:bodyPr vert="horz" lIns="91440" tIns="45720" rIns="91440" bIns="45720" rtlCol="0" anchor="t">
+            <a:normAutofit fontScale="45000" lnSpcReduction="20000"/>
+          </a:bodyPr>
+          <a:lstStyle>
+            <a:lvl1pPr algn="l" defTabSz="457200" rtl="0" eaLnBrk="1" latinLnBrk="1" hangingPunct="1">
+              <a:spcBef>
+                <a:spcPct val="0"/>
+              </a:spcBef>
+              <a:buNone/>
+              <a:defRPr sz="3600" kern="1200">
+                <a:solidFill>
+                  <a:schemeClr val="accent1"/>
+                </a:solidFill>
+                <a:latin typeface="+mj-lt"/>
+                <a:ea typeface="+mj-ea"/>
+                <a:cs typeface="+mj-cs"/>
+              </a:defRPr>
+            </a:lvl1pPr>
+            <a:lvl2pPr eaLnBrk="1" latinLnBrk="1" hangingPunct="1">
+              <a:defRPr>
+                <a:solidFill>
+                  <a:schemeClr val="tx2"/>
+                </a:solidFill>
+              </a:defRPr>
+            </a:lvl2pPr>
+            <a:lvl3pPr eaLnBrk="1" latinLnBrk="1" hangingPunct="1">
+              <a:defRPr>
+                <a:solidFill>
+                  <a:schemeClr val="tx2"/>
+                </a:solidFill>
+              </a:defRPr>
+            </a:lvl3pPr>
+            <a:lvl4pPr eaLnBrk="1" latinLnBrk="1" hangingPunct="1">
+              <a:defRPr>
+                <a:solidFill>
+                  <a:schemeClr val="tx2"/>
+                </a:solidFill>
+              </a:defRPr>
+            </a:lvl4pPr>
+            <a:lvl5pPr eaLnBrk="1" latinLnBrk="1" hangingPunct="1">
+              <a:defRPr>
+                <a:solidFill>
+                  <a:schemeClr val="tx2"/>
+                </a:solidFill>
+              </a:defRPr>
+            </a:lvl5pPr>
+            <a:lvl6pPr eaLnBrk="1" latinLnBrk="1" hangingPunct="1">
+              <a:defRPr>
+                <a:solidFill>
+                  <a:schemeClr val="tx2"/>
+                </a:solidFill>
+              </a:defRPr>
+            </a:lvl6pPr>
+            <a:lvl7pPr eaLnBrk="1" latinLnBrk="1" hangingPunct="1">
+              <a:defRPr>
+                <a:solidFill>
+                  <a:schemeClr val="tx2"/>
+                </a:solidFill>
+              </a:defRPr>
+            </a:lvl7pPr>
+            <a:lvl8pPr eaLnBrk="1" latinLnBrk="1" hangingPunct="1">
+              <a:defRPr>
+                <a:solidFill>
+                  <a:schemeClr val="tx2"/>
+                </a:solidFill>
+              </a:defRPr>
+            </a:lvl8pPr>
+            <a:lvl9pPr eaLnBrk="1" latinLnBrk="1" hangingPunct="1">
+              <a:defRPr>
+                <a:solidFill>
+                  <a:schemeClr val="tx2"/>
+                </a:solidFill>
+              </a:defRPr>
+            </a:lvl9pPr>
+          </a:lstStyle>
+          <a:p>
+            <a:endParaRPr lang="en-US" altLang="ko-KR" dirty="0"/>
+          </a:p>
+          <a:p>
+            <a:r>
+              <a:rPr lang="en-US" altLang="ko-KR" dirty="0" err="1"/>
+              <a:t>login.htlm</a:t>
+            </a:r>
+            <a:endParaRPr lang="ko-KR" altLang="en-US" dirty="0"/>
+          </a:p>
+        </p:txBody>
+      </p:sp>
+    </p:spTree>
+    <p:extLst>
+      <p:ext uri="{BB962C8B-B14F-4D97-AF65-F5344CB8AC3E}">
+        <p14:creationId xmlns:p14="http://schemas.microsoft.com/office/powerpoint/2010/main" val="148411955"/>
       </p:ext>
     </p:extLst>
   </p:cSld>

</xml_diff>

<commit_message>
User Account and Update Pictures
</commit_message>
<xml_diff>
--- a/Study/07. User Account and Profile Picture/User Account and Profile Picture.pptx
+++ b/Study/07. User Account and Profile Picture/User Account and Profile Picture.pptx
@@ -9,8 +9,11 @@
     <p:sldId id="284" r:id="rId3"/>
     <p:sldId id="293" r:id="rId4"/>
     <p:sldId id="294" r:id="rId5"/>
-    <p:sldId id="295" r:id="rId6"/>
-    <p:sldId id="296" r:id="rId7"/>
+    <p:sldId id="297" r:id="rId6"/>
+    <p:sldId id="295" r:id="rId7"/>
+    <p:sldId id="298" r:id="rId8"/>
+    <p:sldId id="296" r:id="rId9"/>
+    <p:sldId id="299" r:id="rId10"/>
   </p:sldIdLst>
   <p:sldSz cx="12192000" cy="6858000"/>
   <p:notesSz cx="6858000" cy="9144000"/>
@@ -839,7 +842,7 @@
           <a:p>
             <a:fld id="{B6FB7DCD-5BA3-48A2-BE8C-591555253DD2}" type="datetimeFigureOut">
               <a:rPr lang="ko-KR" altLang="en-US" smtClean="0"/>
-              <a:t>2020-06-30</a:t>
+              <a:t>2020-07-01</a:t>
             </a:fld>
             <a:endParaRPr lang="ko-KR" altLang="en-US"/>
           </a:p>
@@ -1090,7 +1093,7 @@
           <a:p>
             <a:fld id="{B6FB7DCD-5BA3-48A2-BE8C-591555253DD2}" type="datetimeFigureOut">
               <a:rPr lang="ko-KR" altLang="en-US" smtClean="0"/>
-              <a:t>2020-06-30</a:t>
+              <a:t>2020-07-01</a:t>
             </a:fld>
             <a:endParaRPr lang="ko-KR" altLang="en-US"/>
           </a:p>
@@ -1404,7 +1407,7 @@
           <a:p>
             <a:fld id="{B6FB7DCD-5BA3-48A2-BE8C-591555253DD2}" type="datetimeFigureOut">
               <a:rPr lang="ko-KR" altLang="en-US" smtClean="0"/>
-              <a:t>2020-06-30</a:t>
+              <a:t>2020-07-01</a:t>
             </a:fld>
             <a:endParaRPr lang="ko-KR" altLang="en-US"/>
           </a:p>
@@ -1745,7 +1748,7 @@
           <a:p>
             <a:fld id="{B6FB7DCD-5BA3-48A2-BE8C-591555253DD2}" type="datetimeFigureOut">
               <a:rPr lang="ko-KR" altLang="en-US" smtClean="0"/>
-              <a:t>2020-06-30</a:t>
+              <a:t>2020-07-01</a:t>
             </a:fld>
             <a:endParaRPr lang="ko-KR" altLang="en-US"/>
           </a:p>
@@ -2059,7 +2062,7 @@
           <a:p>
             <a:fld id="{B6FB7DCD-5BA3-48A2-BE8C-591555253DD2}" type="datetimeFigureOut">
               <a:rPr lang="ko-KR" altLang="en-US" smtClean="0"/>
-              <a:t>2020-06-30</a:t>
+              <a:t>2020-07-01</a:t>
             </a:fld>
             <a:endParaRPr lang="ko-KR" altLang="en-US"/>
           </a:p>
@@ -2452,7 +2455,7 @@
           <a:p>
             <a:fld id="{B6FB7DCD-5BA3-48A2-BE8C-591555253DD2}" type="datetimeFigureOut">
               <a:rPr lang="ko-KR" altLang="en-US" smtClean="0"/>
-              <a:t>2020-06-30</a:t>
+              <a:t>2020-07-01</a:t>
             </a:fld>
             <a:endParaRPr lang="ko-KR" altLang="en-US"/>
           </a:p>
@@ -2622,7 +2625,7 @@
           <a:p>
             <a:fld id="{B6FB7DCD-5BA3-48A2-BE8C-591555253DD2}" type="datetimeFigureOut">
               <a:rPr lang="ko-KR" altLang="en-US" smtClean="0"/>
-              <a:t>2020-06-30</a:t>
+              <a:t>2020-07-01</a:t>
             </a:fld>
             <a:endParaRPr lang="ko-KR" altLang="en-US"/>
           </a:p>
@@ -2802,7 +2805,7 @@
           <a:p>
             <a:fld id="{B6FB7DCD-5BA3-48A2-BE8C-591555253DD2}" type="datetimeFigureOut">
               <a:rPr lang="ko-KR" altLang="en-US" smtClean="0"/>
-              <a:t>2020-06-30</a:t>
+              <a:t>2020-07-01</a:t>
             </a:fld>
             <a:endParaRPr lang="ko-KR" altLang="en-US"/>
           </a:p>
@@ -2978,7 +2981,7 @@
           <a:p>
             <a:fld id="{B6FB7DCD-5BA3-48A2-BE8C-591555253DD2}" type="datetimeFigureOut">
               <a:rPr lang="ko-KR" altLang="en-US" smtClean="0"/>
-              <a:t>2020-06-30</a:t>
+              <a:t>2020-07-01</a:t>
             </a:fld>
             <a:endParaRPr lang="ko-KR" altLang="en-US"/>
           </a:p>
@@ -3225,7 +3228,7 @@
           <a:p>
             <a:fld id="{B6FB7DCD-5BA3-48A2-BE8C-591555253DD2}" type="datetimeFigureOut">
               <a:rPr lang="ko-KR" altLang="en-US" smtClean="0"/>
-              <a:t>2020-06-30</a:t>
+              <a:t>2020-07-01</a:t>
             </a:fld>
             <a:endParaRPr lang="ko-KR" altLang="en-US"/>
           </a:p>
@@ -3457,7 +3460,7 @@
           <a:p>
             <a:fld id="{B6FB7DCD-5BA3-48A2-BE8C-591555253DD2}" type="datetimeFigureOut">
               <a:rPr lang="ko-KR" altLang="en-US" smtClean="0"/>
-              <a:t>2020-06-30</a:t>
+              <a:t>2020-07-01</a:t>
             </a:fld>
             <a:endParaRPr lang="ko-KR" altLang="en-US"/>
           </a:p>
@@ -3831,7 +3834,7 @@
           <a:p>
             <a:fld id="{B6FB7DCD-5BA3-48A2-BE8C-591555253DD2}" type="datetimeFigureOut">
               <a:rPr lang="ko-KR" altLang="en-US" smtClean="0"/>
-              <a:t>2020-06-30</a:t>
+              <a:t>2020-07-01</a:t>
             </a:fld>
             <a:endParaRPr lang="ko-KR" altLang="en-US"/>
           </a:p>
@@ -3954,7 +3957,7 @@
           <a:p>
             <a:fld id="{B6FB7DCD-5BA3-48A2-BE8C-591555253DD2}" type="datetimeFigureOut">
               <a:rPr lang="ko-KR" altLang="en-US" smtClean="0"/>
-              <a:t>2020-06-30</a:t>
+              <a:t>2020-07-01</a:t>
             </a:fld>
             <a:endParaRPr lang="ko-KR" altLang="en-US"/>
           </a:p>
@@ -4049,7 +4052,7 @@
           <a:p>
             <a:fld id="{B6FB7DCD-5BA3-48A2-BE8C-591555253DD2}" type="datetimeFigureOut">
               <a:rPr lang="ko-KR" altLang="en-US" smtClean="0"/>
-              <a:t>2020-06-30</a:t>
+              <a:t>2020-07-01</a:t>
             </a:fld>
             <a:endParaRPr lang="ko-KR" altLang="en-US"/>
           </a:p>
@@ -4304,7 +4307,7 @@
           <a:p>
             <a:fld id="{B6FB7DCD-5BA3-48A2-BE8C-591555253DD2}" type="datetimeFigureOut">
               <a:rPr lang="ko-KR" altLang="en-US" smtClean="0"/>
-              <a:t>2020-06-30</a:t>
+              <a:t>2020-07-01</a:t>
             </a:fld>
             <a:endParaRPr lang="ko-KR" altLang="en-US"/>
           </a:p>
@@ -4567,7 +4570,7 @@
           <a:p>
             <a:fld id="{B6FB7DCD-5BA3-48A2-BE8C-591555253DD2}" type="datetimeFigureOut">
               <a:rPr lang="ko-KR" altLang="en-US" smtClean="0"/>
-              <a:t>2020-06-30</a:t>
+              <a:t>2020-07-01</a:t>
             </a:fld>
             <a:endParaRPr lang="ko-KR" altLang="en-US"/>
           </a:p>
@@ -5310,7 +5313,7 @@
           <a:p>
             <a:fld id="{B6FB7DCD-5BA3-48A2-BE8C-591555253DD2}" type="datetimeFigureOut">
               <a:rPr lang="ko-KR" altLang="en-US" smtClean="0"/>
-              <a:t>2020-06-30</a:t>
+              <a:t>2020-07-01</a:t>
             </a:fld>
             <a:endParaRPr lang="ko-KR" altLang="en-US"/>
           </a:p>
@@ -6248,6 +6251,66 @@
           </a:p>
         </p:txBody>
       </p:sp>
+      <p:pic>
+        <p:nvPicPr>
+          <p:cNvPr id="3" name="그림 2">
+            <a:extLst>
+              <a:ext uri="{FF2B5EF4-FFF2-40B4-BE49-F238E27FC236}">
+                <a16:creationId xmlns:a16="http://schemas.microsoft.com/office/drawing/2014/main" id="{1553DBA3-43E8-414D-9DA0-8FEF396E4353}"/>
+              </a:ext>
+            </a:extLst>
+          </p:cNvPr>
+          <p:cNvPicPr>
+            <a:picLocks noChangeAspect="1"/>
+          </p:cNvPicPr>
+          <p:nvPr/>
+        </p:nvPicPr>
+        <p:blipFill>
+          <a:blip r:embed="rId2"/>
+          <a:stretch>
+            <a:fillRect/>
+          </a:stretch>
+        </p:blipFill>
+        <p:spPr>
+          <a:xfrm>
+            <a:off x="100614" y="3100831"/>
+            <a:ext cx="7175708" cy="3757169"/>
+          </a:xfrm>
+          <a:prstGeom prst="rect">
+            <a:avLst/>
+          </a:prstGeom>
+        </p:spPr>
+      </p:pic>
+      <p:pic>
+        <p:nvPicPr>
+          <p:cNvPr id="4" name="그림 3">
+            <a:extLst>
+              <a:ext uri="{FF2B5EF4-FFF2-40B4-BE49-F238E27FC236}">
+                <a16:creationId xmlns:a16="http://schemas.microsoft.com/office/drawing/2014/main" id="{A624455C-E633-4900-8844-B765296F8F19}"/>
+              </a:ext>
+            </a:extLst>
+          </p:cNvPr>
+          <p:cNvPicPr>
+            <a:picLocks noChangeAspect="1"/>
+          </p:cNvPicPr>
+          <p:nvPr/>
+        </p:nvPicPr>
+        <p:blipFill>
+          <a:blip r:embed="rId3"/>
+          <a:stretch>
+            <a:fillRect/>
+          </a:stretch>
+        </p:blipFill>
+        <p:spPr>
+          <a:xfrm>
+            <a:off x="100614" y="1662078"/>
+            <a:ext cx="7175708" cy="1326829"/>
+          </a:xfrm>
+          <a:prstGeom prst="rect">
+            <a:avLst/>
+          </a:prstGeom>
+        </p:spPr>
+      </p:pic>
     </p:spTree>
     <p:extLst>
       <p:ext uri="{BB962C8B-B14F-4D97-AF65-F5344CB8AC3E}">
@@ -6519,6 +6582,36 @@
           </a:p>
         </p:txBody>
       </p:sp>
+      <p:pic>
+        <p:nvPicPr>
+          <p:cNvPr id="3" name="그림 2">
+            <a:extLst>
+              <a:ext uri="{FF2B5EF4-FFF2-40B4-BE49-F238E27FC236}">
+                <a16:creationId xmlns:a16="http://schemas.microsoft.com/office/drawing/2014/main" id="{66693673-75A7-4F89-B915-35643B820144}"/>
+              </a:ext>
+            </a:extLst>
+          </p:cNvPr>
+          <p:cNvPicPr>
+            <a:picLocks noChangeAspect="1"/>
+          </p:cNvPicPr>
+          <p:nvPr/>
+        </p:nvPicPr>
+        <p:blipFill>
+          <a:blip r:embed="rId2"/>
+          <a:stretch>
+            <a:fillRect/>
+          </a:stretch>
+        </p:blipFill>
+        <p:spPr>
+          <a:xfrm>
+            <a:off x="341481" y="2307157"/>
+            <a:ext cx="7152300" cy="3941243"/>
+          </a:xfrm>
+          <a:prstGeom prst="rect">
+            <a:avLst/>
+          </a:prstGeom>
+        </p:spPr>
+      </p:pic>
     </p:spTree>
     <p:extLst>
       <p:ext uri="{BB962C8B-B14F-4D97-AF65-F5344CB8AC3E}">
@@ -6695,7 +6788,7 @@
         </p:nvSpPr>
         <p:spPr>
           <a:xfrm>
-            <a:off x="1109177" y="1144214"/>
+            <a:off x="1091421" y="1144214"/>
             <a:ext cx="7768494" cy="517864"/>
           </a:xfrm>
           <a:prstGeom prst="rect">
@@ -6783,17 +6876,47 @@
           </a:p>
           <a:p>
             <a:r>
-              <a:rPr lang="en-US" altLang="ko-KR" dirty="0" err="1"/>
-              <a:t>account.htlm</a:t>
+              <a:rPr lang="en-US" altLang="ko-KR" dirty="0"/>
+              <a:t>routes.py</a:t>
             </a:r>
             <a:endParaRPr lang="ko-KR" altLang="en-US" dirty="0"/>
           </a:p>
         </p:txBody>
       </p:sp>
+      <p:pic>
+        <p:nvPicPr>
+          <p:cNvPr id="4" name="그림 3">
+            <a:extLst>
+              <a:ext uri="{FF2B5EF4-FFF2-40B4-BE49-F238E27FC236}">
+                <a16:creationId xmlns:a16="http://schemas.microsoft.com/office/drawing/2014/main" id="{57D5A6DD-8DDF-434F-94E7-FF747465031E}"/>
+              </a:ext>
+            </a:extLst>
+          </p:cNvPr>
+          <p:cNvPicPr>
+            <a:picLocks noChangeAspect="1"/>
+          </p:cNvPicPr>
+          <p:nvPr/>
+        </p:nvPicPr>
+        <p:blipFill>
+          <a:blip r:embed="rId2"/>
+          <a:stretch>
+            <a:fillRect/>
+          </a:stretch>
+        </p:blipFill>
+        <p:spPr>
+          <a:xfrm>
+            <a:off x="342758" y="1969081"/>
+            <a:ext cx="7278116" cy="2724530"/>
+          </a:xfrm>
+          <a:prstGeom prst="rect">
+            <a:avLst/>
+          </a:prstGeom>
+        </p:spPr>
+      </p:pic>
     </p:spTree>
     <p:extLst>
       <p:ext uri="{BB962C8B-B14F-4D97-AF65-F5344CB8AC3E}">
-        <p14:creationId xmlns:p14="http://schemas.microsoft.com/office/powerpoint/2010/main" val="1016715967"/>
+        <p14:creationId xmlns:p14="http://schemas.microsoft.com/office/powerpoint/2010/main" val="1467685074"/>
       </p:ext>
     </p:extLst>
   </p:cSld>
@@ -7055,16 +7178,949 @@
           <a:p>
             <a:r>
               <a:rPr lang="en-US" altLang="ko-KR" dirty="0" err="1"/>
+              <a:t>account.htlm</a:t>
+            </a:r>
+            <a:endParaRPr lang="ko-KR" altLang="en-US" dirty="0"/>
+          </a:p>
+        </p:txBody>
+      </p:sp>
+      <p:pic>
+        <p:nvPicPr>
+          <p:cNvPr id="3" name="그림 2">
+            <a:extLst>
+              <a:ext uri="{FF2B5EF4-FFF2-40B4-BE49-F238E27FC236}">
+                <a16:creationId xmlns:a16="http://schemas.microsoft.com/office/drawing/2014/main" id="{AB814CC1-D01F-4D4B-9DC2-C72321384E26}"/>
+              </a:ext>
+            </a:extLst>
+          </p:cNvPr>
+          <p:cNvPicPr>
+            <a:picLocks noChangeAspect="1"/>
+          </p:cNvPicPr>
+          <p:nvPr/>
+        </p:nvPicPr>
+        <p:blipFill>
+          <a:blip r:embed="rId2"/>
+          <a:stretch>
+            <a:fillRect/>
+          </a:stretch>
+        </p:blipFill>
+        <p:spPr>
+          <a:xfrm>
+            <a:off x="338905" y="1662078"/>
+            <a:ext cx="6701087" cy="4990833"/>
+          </a:xfrm>
+          <a:prstGeom prst="rect">
+            <a:avLst/>
+          </a:prstGeom>
+        </p:spPr>
+      </p:pic>
+    </p:spTree>
+    <p:extLst>
+      <p:ext uri="{BB962C8B-B14F-4D97-AF65-F5344CB8AC3E}">
+        <p14:creationId xmlns:p14="http://schemas.microsoft.com/office/powerpoint/2010/main" val="1016715967"/>
+      </p:ext>
+    </p:extLst>
+  </p:cSld>
+  <p:clrMapOvr>
+    <a:masterClrMapping/>
+  </p:clrMapOvr>
+</p:sld>
+</file>
+
+<file path=ppt/slides/slide7.xml><?xml version="1.0" encoding="utf-8"?>
+<p:sld xmlns:a="http://schemas.openxmlformats.org/drawingml/2006/main" xmlns:r="http://schemas.openxmlformats.org/officeDocument/2006/relationships" xmlns:p="http://schemas.openxmlformats.org/presentationml/2006/main">
+  <p:cSld>
+    <p:spTree>
+      <p:nvGrpSpPr>
+        <p:cNvPr id="1" name=""/>
+        <p:cNvGrpSpPr/>
+        <p:nvPr/>
+      </p:nvGrpSpPr>
+      <p:grpSpPr>
+        <a:xfrm>
+          <a:off x="0" y="0"/>
+          <a:ext cx="0" cy="0"/>
+          <a:chOff x="0" y="0"/>
+          <a:chExt cx="0" cy="0"/>
+        </a:xfrm>
+      </p:grpSpPr>
+      <p:sp>
+        <p:nvSpPr>
+          <p:cNvPr id="2" name="제목 1">
+            <a:extLst>
+              <a:ext uri="{FF2B5EF4-FFF2-40B4-BE49-F238E27FC236}">
+                <a16:creationId xmlns:a16="http://schemas.microsoft.com/office/drawing/2014/main" id="{2EC833C6-FAC3-442B-803D-3FB02DF07980}"/>
+              </a:ext>
+            </a:extLst>
+          </p:cNvPr>
+          <p:cNvSpPr>
+            <a:spLocks noGrp="1"/>
+          </p:cNvSpPr>
+          <p:nvPr>
+            <p:ph type="title"/>
+          </p:nvPr>
+        </p:nvSpPr>
+        <p:spPr>
+          <a:xfrm>
+            <a:off x="677334" y="609600"/>
+            <a:ext cx="8596668" cy="517864"/>
+          </a:xfrm>
+        </p:spPr>
+        <p:txBody>
+          <a:bodyPr>
+            <a:normAutofit fontScale="90000"/>
+          </a:bodyPr>
+          <a:lstStyle/>
+          <a:p>
+            <a:r>
+              <a:rPr lang="en-US" altLang="ko-KR" dirty="0"/>
+              <a:t>7. User Account and Profile Picture</a:t>
+            </a:r>
+            <a:endParaRPr lang="ko-KR" altLang="en-US" dirty="0"/>
+          </a:p>
+        </p:txBody>
+      </p:sp>
+      <p:sp>
+        <p:nvSpPr>
+          <p:cNvPr id="6" name="직사각형 5">
+            <a:extLst>
+              <a:ext uri="{FF2B5EF4-FFF2-40B4-BE49-F238E27FC236}">
+                <a16:creationId xmlns:a16="http://schemas.microsoft.com/office/drawing/2014/main" id="{6A60F032-B172-43E0-B147-16329887DE8F}"/>
+              </a:ext>
+            </a:extLst>
+          </p:cNvPr>
+          <p:cNvSpPr/>
+          <p:nvPr/>
+        </p:nvSpPr>
+        <p:spPr>
+          <a:xfrm>
+            <a:off x="7620874" y="2196693"/>
+            <a:ext cx="4470512" cy="1384995"/>
+          </a:xfrm>
+          <a:prstGeom prst="rect">
+            <a:avLst/>
+          </a:prstGeom>
+        </p:spPr>
+        <p:txBody>
+          <a:bodyPr wrap="square">
+            <a:spAutoFit/>
+          </a:bodyPr>
+          <a:lstStyle/>
+          <a:p>
+            <a:pPr marL="285750" indent="-285750">
+              <a:buFontTx/>
+              <a:buChar char="-"/>
+            </a:pPr>
+            <a:r>
+              <a:rPr lang="en-US" altLang="ko-KR" sz="1400" dirty="0" err="1"/>
+              <a:t>WTForms</a:t>
+            </a:r>
+            <a:r>
+              <a:rPr lang="ko-KR" altLang="en-US" sz="1400" dirty="0"/>
+              <a:t>로 작업할 때 </a:t>
+            </a:r>
+            <a:r>
+              <a:rPr lang="en-US" altLang="ko-KR" sz="1400" dirty="0"/>
+              <a:t>class</a:t>
+            </a:r>
+            <a:r>
+              <a:rPr lang="ko-KR" altLang="en-US" sz="1400" dirty="0"/>
+              <a:t>로 먼저 그 </a:t>
+            </a:r>
+            <a:r>
+              <a:rPr lang="en-US" altLang="ko-KR" sz="1400" dirty="0"/>
+              <a:t>forms</a:t>
+            </a:r>
+            <a:r>
+              <a:rPr lang="ko-KR" altLang="en-US" sz="1400" dirty="0"/>
+              <a:t>을 정의 </a:t>
+            </a:r>
+            <a:r>
+              <a:rPr lang="ko-KR" altLang="en-US" sz="1400" dirty="0" err="1"/>
+              <a:t>해야한다</a:t>
+            </a:r>
+            <a:r>
+              <a:rPr lang="en-US" altLang="ko-KR" sz="1400" dirty="0"/>
+              <a:t>.</a:t>
+            </a:r>
+          </a:p>
+          <a:p>
+            <a:pPr marL="285750" indent="-285750">
+              <a:buFontTx/>
+              <a:buChar char="-"/>
+            </a:pPr>
+            <a:r>
+              <a:rPr lang="ko-KR" altLang="en-US" sz="1400" dirty="0"/>
+              <a:t>어플리케이션을 여러 모듈로 쪼개고 </a:t>
+            </a:r>
+            <a:r>
+              <a:rPr lang="en-US" altLang="ko-KR" sz="1400" dirty="0"/>
+              <a:t>form</a:t>
+            </a:r>
+            <a:r>
+              <a:rPr lang="ko-KR" altLang="en-US" sz="1400" dirty="0"/>
+              <a:t>에 대한 분리된 모듈을 추가하는 것이 권고된다</a:t>
+            </a:r>
+            <a:r>
+              <a:rPr lang="en-US" altLang="ko-KR" sz="1400" dirty="0"/>
+              <a:t>.</a:t>
+            </a:r>
+          </a:p>
+          <a:p>
+            <a:endParaRPr lang="en-US" altLang="ko-KR" sz="1400" dirty="0"/>
+          </a:p>
+          <a:p>
+            <a:endParaRPr lang="en-US" altLang="ko-KR" sz="1400" dirty="0"/>
+          </a:p>
+        </p:txBody>
+      </p:sp>
+      <p:sp>
+        <p:nvSpPr>
+          <p:cNvPr id="7" name="제목 1">
+            <a:extLst>
+              <a:ext uri="{FF2B5EF4-FFF2-40B4-BE49-F238E27FC236}">
+                <a16:creationId xmlns:a16="http://schemas.microsoft.com/office/drawing/2014/main" id="{453FF060-58F0-4366-9AA1-883792CE5955}"/>
+              </a:ext>
+            </a:extLst>
+          </p:cNvPr>
+          <p:cNvSpPr txBox="1">
+            <a:spLocks/>
+          </p:cNvSpPr>
+          <p:nvPr/>
+        </p:nvSpPr>
+        <p:spPr>
+          <a:xfrm>
+            <a:off x="1109177" y="1144214"/>
+            <a:ext cx="7768494" cy="517864"/>
+          </a:xfrm>
+          <a:prstGeom prst="rect">
+            <a:avLst/>
+          </a:prstGeom>
+        </p:spPr>
+        <p:txBody>
+          <a:bodyPr vert="horz" lIns="91440" tIns="45720" rIns="91440" bIns="45720" rtlCol="0" anchor="t">
+            <a:normAutofit fontScale="45000" lnSpcReduction="20000"/>
+          </a:bodyPr>
+          <a:lstStyle>
+            <a:lvl1pPr algn="l" defTabSz="457200" rtl="0" eaLnBrk="1" latinLnBrk="1" hangingPunct="1">
+              <a:spcBef>
+                <a:spcPct val="0"/>
+              </a:spcBef>
+              <a:buNone/>
+              <a:defRPr sz="3600" kern="1200">
+                <a:solidFill>
+                  <a:schemeClr val="accent1"/>
+                </a:solidFill>
+                <a:latin typeface="+mj-lt"/>
+                <a:ea typeface="+mj-ea"/>
+                <a:cs typeface="+mj-cs"/>
+              </a:defRPr>
+            </a:lvl1pPr>
+            <a:lvl2pPr eaLnBrk="1" latinLnBrk="1" hangingPunct="1">
+              <a:defRPr>
+                <a:solidFill>
+                  <a:schemeClr val="tx2"/>
+                </a:solidFill>
+              </a:defRPr>
+            </a:lvl2pPr>
+            <a:lvl3pPr eaLnBrk="1" latinLnBrk="1" hangingPunct="1">
+              <a:defRPr>
+                <a:solidFill>
+                  <a:schemeClr val="tx2"/>
+                </a:solidFill>
+              </a:defRPr>
+            </a:lvl3pPr>
+            <a:lvl4pPr eaLnBrk="1" latinLnBrk="1" hangingPunct="1">
+              <a:defRPr>
+                <a:solidFill>
+                  <a:schemeClr val="tx2"/>
+                </a:solidFill>
+              </a:defRPr>
+            </a:lvl4pPr>
+            <a:lvl5pPr eaLnBrk="1" latinLnBrk="1" hangingPunct="1">
+              <a:defRPr>
+                <a:solidFill>
+                  <a:schemeClr val="tx2"/>
+                </a:solidFill>
+              </a:defRPr>
+            </a:lvl5pPr>
+            <a:lvl6pPr eaLnBrk="1" latinLnBrk="1" hangingPunct="1">
+              <a:defRPr>
+                <a:solidFill>
+                  <a:schemeClr val="tx2"/>
+                </a:solidFill>
+              </a:defRPr>
+            </a:lvl6pPr>
+            <a:lvl7pPr eaLnBrk="1" latinLnBrk="1" hangingPunct="1">
+              <a:defRPr>
+                <a:solidFill>
+                  <a:schemeClr val="tx2"/>
+                </a:solidFill>
+              </a:defRPr>
+            </a:lvl7pPr>
+            <a:lvl8pPr eaLnBrk="1" latinLnBrk="1" hangingPunct="1">
+              <a:defRPr>
+                <a:solidFill>
+                  <a:schemeClr val="tx2"/>
+                </a:solidFill>
+              </a:defRPr>
+            </a:lvl8pPr>
+            <a:lvl9pPr eaLnBrk="1" latinLnBrk="1" hangingPunct="1">
+              <a:defRPr>
+                <a:solidFill>
+                  <a:schemeClr val="tx2"/>
+                </a:solidFill>
+              </a:defRPr>
+            </a:lvl9pPr>
+          </a:lstStyle>
+          <a:p>
+            <a:endParaRPr lang="en-US" altLang="ko-KR" dirty="0"/>
+          </a:p>
+          <a:p>
+            <a:r>
+              <a:rPr lang="en-US" altLang="ko-KR" dirty="0" err="1"/>
+              <a:t>account.htlm</a:t>
+            </a:r>
+            <a:endParaRPr lang="ko-KR" altLang="en-US" dirty="0"/>
+          </a:p>
+        </p:txBody>
+      </p:sp>
+      <p:pic>
+        <p:nvPicPr>
+          <p:cNvPr id="4" name="그림 3">
+            <a:extLst>
+              <a:ext uri="{FF2B5EF4-FFF2-40B4-BE49-F238E27FC236}">
+                <a16:creationId xmlns:a16="http://schemas.microsoft.com/office/drawing/2014/main" id="{4BE363A1-E843-4DE4-8C4B-9DB27CA6E56E}"/>
+              </a:ext>
+            </a:extLst>
+          </p:cNvPr>
+          <p:cNvPicPr>
+            <a:picLocks noChangeAspect="1"/>
+          </p:cNvPicPr>
+          <p:nvPr/>
+        </p:nvPicPr>
+        <p:blipFill>
+          <a:blip r:embed="rId2"/>
+          <a:stretch>
+            <a:fillRect/>
+          </a:stretch>
+        </p:blipFill>
+        <p:spPr>
+          <a:xfrm>
+            <a:off x="252927" y="1689925"/>
+            <a:ext cx="6112362" cy="4928369"/>
+          </a:xfrm>
+          <a:prstGeom prst="rect">
+            <a:avLst/>
+          </a:prstGeom>
+        </p:spPr>
+      </p:pic>
+    </p:spTree>
+    <p:extLst>
+      <p:ext uri="{BB962C8B-B14F-4D97-AF65-F5344CB8AC3E}">
+        <p14:creationId xmlns:p14="http://schemas.microsoft.com/office/powerpoint/2010/main" val="3132125180"/>
+      </p:ext>
+    </p:extLst>
+  </p:cSld>
+  <p:clrMapOvr>
+    <a:masterClrMapping/>
+  </p:clrMapOvr>
+</p:sld>
+</file>
+
+<file path=ppt/slides/slide8.xml><?xml version="1.0" encoding="utf-8"?>
+<p:sld xmlns:a="http://schemas.openxmlformats.org/drawingml/2006/main" xmlns:r="http://schemas.openxmlformats.org/officeDocument/2006/relationships" xmlns:p="http://schemas.openxmlformats.org/presentationml/2006/main">
+  <p:cSld>
+    <p:spTree>
+      <p:nvGrpSpPr>
+        <p:cNvPr id="1" name=""/>
+        <p:cNvGrpSpPr/>
+        <p:nvPr/>
+      </p:nvGrpSpPr>
+      <p:grpSpPr>
+        <a:xfrm>
+          <a:off x="0" y="0"/>
+          <a:ext cx="0" cy="0"/>
+          <a:chOff x="0" y="0"/>
+          <a:chExt cx="0" cy="0"/>
+        </a:xfrm>
+      </p:grpSpPr>
+      <p:sp>
+        <p:nvSpPr>
+          <p:cNvPr id="2" name="제목 1">
+            <a:extLst>
+              <a:ext uri="{FF2B5EF4-FFF2-40B4-BE49-F238E27FC236}">
+                <a16:creationId xmlns:a16="http://schemas.microsoft.com/office/drawing/2014/main" id="{2EC833C6-FAC3-442B-803D-3FB02DF07980}"/>
+              </a:ext>
+            </a:extLst>
+          </p:cNvPr>
+          <p:cNvSpPr>
+            <a:spLocks noGrp="1"/>
+          </p:cNvSpPr>
+          <p:nvPr>
+            <p:ph type="title"/>
+          </p:nvPr>
+        </p:nvSpPr>
+        <p:spPr>
+          <a:xfrm>
+            <a:off x="677334" y="609600"/>
+            <a:ext cx="8596668" cy="517864"/>
+          </a:xfrm>
+        </p:spPr>
+        <p:txBody>
+          <a:bodyPr>
+            <a:normAutofit fontScale="90000"/>
+          </a:bodyPr>
+          <a:lstStyle/>
+          <a:p>
+            <a:r>
+              <a:rPr lang="en-US" altLang="ko-KR" dirty="0"/>
+              <a:t>7. User Account and Profile Picture</a:t>
+            </a:r>
+            <a:endParaRPr lang="ko-KR" altLang="en-US" dirty="0"/>
+          </a:p>
+        </p:txBody>
+      </p:sp>
+      <p:sp>
+        <p:nvSpPr>
+          <p:cNvPr id="6" name="직사각형 5">
+            <a:extLst>
+              <a:ext uri="{FF2B5EF4-FFF2-40B4-BE49-F238E27FC236}">
+                <a16:creationId xmlns:a16="http://schemas.microsoft.com/office/drawing/2014/main" id="{6A60F032-B172-43E0-B147-16329887DE8F}"/>
+              </a:ext>
+            </a:extLst>
+          </p:cNvPr>
+          <p:cNvSpPr/>
+          <p:nvPr/>
+        </p:nvSpPr>
+        <p:spPr>
+          <a:xfrm>
+            <a:off x="7620874" y="2196693"/>
+            <a:ext cx="4470512" cy="1384995"/>
+          </a:xfrm>
+          <a:prstGeom prst="rect">
+            <a:avLst/>
+          </a:prstGeom>
+        </p:spPr>
+        <p:txBody>
+          <a:bodyPr wrap="square">
+            <a:spAutoFit/>
+          </a:bodyPr>
+          <a:lstStyle/>
+          <a:p>
+            <a:pPr marL="285750" indent="-285750">
+              <a:buFontTx/>
+              <a:buChar char="-"/>
+            </a:pPr>
+            <a:r>
+              <a:rPr lang="en-US" altLang="ko-KR" sz="1400" dirty="0" err="1"/>
+              <a:t>WTForms</a:t>
+            </a:r>
+            <a:r>
+              <a:rPr lang="ko-KR" altLang="en-US" sz="1400" dirty="0"/>
+              <a:t>로 작업할 때 </a:t>
+            </a:r>
+            <a:r>
+              <a:rPr lang="en-US" altLang="ko-KR" sz="1400" dirty="0"/>
+              <a:t>class</a:t>
+            </a:r>
+            <a:r>
+              <a:rPr lang="ko-KR" altLang="en-US" sz="1400" dirty="0"/>
+              <a:t>로 먼저 그 </a:t>
+            </a:r>
+            <a:r>
+              <a:rPr lang="en-US" altLang="ko-KR" sz="1400" dirty="0"/>
+              <a:t>forms</a:t>
+            </a:r>
+            <a:r>
+              <a:rPr lang="ko-KR" altLang="en-US" sz="1400" dirty="0"/>
+              <a:t>을 정의 </a:t>
+            </a:r>
+            <a:r>
+              <a:rPr lang="ko-KR" altLang="en-US" sz="1400" dirty="0" err="1"/>
+              <a:t>해야한다</a:t>
+            </a:r>
+            <a:r>
+              <a:rPr lang="en-US" altLang="ko-KR" sz="1400" dirty="0"/>
+              <a:t>.</a:t>
+            </a:r>
+          </a:p>
+          <a:p>
+            <a:pPr marL="285750" indent="-285750">
+              <a:buFontTx/>
+              <a:buChar char="-"/>
+            </a:pPr>
+            <a:r>
+              <a:rPr lang="ko-KR" altLang="en-US" sz="1400" dirty="0"/>
+              <a:t>어플리케이션을 여러 모듈로 쪼개고 </a:t>
+            </a:r>
+            <a:r>
+              <a:rPr lang="en-US" altLang="ko-KR" sz="1400" dirty="0"/>
+              <a:t>form</a:t>
+            </a:r>
+            <a:r>
+              <a:rPr lang="ko-KR" altLang="en-US" sz="1400" dirty="0"/>
+              <a:t>에 대한 분리된 모듈을 추가하는 것이 권고된다</a:t>
+            </a:r>
+            <a:r>
+              <a:rPr lang="en-US" altLang="ko-KR" sz="1400" dirty="0"/>
+              <a:t>.</a:t>
+            </a:r>
+          </a:p>
+          <a:p>
+            <a:endParaRPr lang="en-US" altLang="ko-KR" sz="1400" dirty="0"/>
+          </a:p>
+          <a:p>
+            <a:endParaRPr lang="en-US" altLang="ko-KR" sz="1400" dirty="0"/>
+          </a:p>
+        </p:txBody>
+      </p:sp>
+      <p:sp>
+        <p:nvSpPr>
+          <p:cNvPr id="7" name="제목 1">
+            <a:extLst>
+              <a:ext uri="{FF2B5EF4-FFF2-40B4-BE49-F238E27FC236}">
+                <a16:creationId xmlns:a16="http://schemas.microsoft.com/office/drawing/2014/main" id="{453FF060-58F0-4366-9AA1-883792CE5955}"/>
+              </a:ext>
+            </a:extLst>
+          </p:cNvPr>
+          <p:cNvSpPr txBox="1">
+            <a:spLocks/>
+          </p:cNvSpPr>
+          <p:nvPr/>
+        </p:nvSpPr>
+        <p:spPr>
+          <a:xfrm>
+            <a:off x="1109177" y="1144214"/>
+            <a:ext cx="7768494" cy="517864"/>
+          </a:xfrm>
+          <a:prstGeom prst="rect">
+            <a:avLst/>
+          </a:prstGeom>
+        </p:spPr>
+        <p:txBody>
+          <a:bodyPr vert="horz" lIns="91440" tIns="45720" rIns="91440" bIns="45720" rtlCol="0" anchor="t">
+            <a:normAutofit fontScale="45000" lnSpcReduction="20000"/>
+          </a:bodyPr>
+          <a:lstStyle>
+            <a:lvl1pPr algn="l" defTabSz="457200" rtl="0" eaLnBrk="1" latinLnBrk="1" hangingPunct="1">
+              <a:spcBef>
+                <a:spcPct val="0"/>
+              </a:spcBef>
+              <a:buNone/>
+              <a:defRPr sz="3600" kern="1200">
+                <a:solidFill>
+                  <a:schemeClr val="accent1"/>
+                </a:solidFill>
+                <a:latin typeface="+mj-lt"/>
+                <a:ea typeface="+mj-ea"/>
+                <a:cs typeface="+mj-cs"/>
+              </a:defRPr>
+            </a:lvl1pPr>
+            <a:lvl2pPr eaLnBrk="1" latinLnBrk="1" hangingPunct="1">
+              <a:defRPr>
+                <a:solidFill>
+                  <a:schemeClr val="tx2"/>
+                </a:solidFill>
+              </a:defRPr>
+            </a:lvl2pPr>
+            <a:lvl3pPr eaLnBrk="1" latinLnBrk="1" hangingPunct="1">
+              <a:defRPr>
+                <a:solidFill>
+                  <a:schemeClr val="tx2"/>
+                </a:solidFill>
+              </a:defRPr>
+            </a:lvl3pPr>
+            <a:lvl4pPr eaLnBrk="1" latinLnBrk="1" hangingPunct="1">
+              <a:defRPr>
+                <a:solidFill>
+                  <a:schemeClr val="tx2"/>
+                </a:solidFill>
+              </a:defRPr>
+            </a:lvl4pPr>
+            <a:lvl5pPr eaLnBrk="1" latinLnBrk="1" hangingPunct="1">
+              <a:defRPr>
+                <a:solidFill>
+                  <a:schemeClr val="tx2"/>
+                </a:solidFill>
+              </a:defRPr>
+            </a:lvl5pPr>
+            <a:lvl6pPr eaLnBrk="1" latinLnBrk="1" hangingPunct="1">
+              <a:defRPr>
+                <a:solidFill>
+                  <a:schemeClr val="tx2"/>
+                </a:solidFill>
+              </a:defRPr>
+            </a:lvl6pPr>
+            <a:lvl7pPr eaLnBrk="1" latinLnBrk="1" hangingPunct="1">
+              <a:defRPr>
+                <a:solidFill>
+                  <a:schemeClr val="tx2"/>
+                </a:solidFill>
+              </a:defRPr>
+            </a:lvl7pPr>
+            <a:lvl8pPr eaLnBrk="1" latinLnBrk="1" hangingPunct="1">
+              <a:defRPr>
+                <a:solidFill>
+                  <a:schemeClr val="tx2"/>
+                </a:solidFill>
+              </a:defRPr>
+            </a:lvl8pPr>
+            <a:lvl9pPr eaLnBrk="1" latinLnBrk="1" hangingPunct="1">
+              <a:defRPr>
+                <a:solidFill>
+                  <a:schemeClr val="tx2"/>
+                </a:solidFill>
+              </a:defRPr>
+            </a:lvl9pPr>
+          </a:lstStyle>
+          <a:p>
+            <a:endParaRPr lang="en-US" altLang="ko-KR" dirty="0"/>
+          </a:p>
+          <a:p>
+            <a:r>
+              <a:rPr lang="en-US" altLang="ko-KR" dirty="0" err="1"/>
               <a:t>login.htlm</a:t>
             </a:r>
             <a:endParaRPr lang="ko-KR" altLang="en-US" dirty="0"/>
           </a:p>
         </p:txBody>
       </p:sp>
+      <p:pic>
+        <p:nvPicPr>
+          <p:cNvPr id="3" name="그림 2">
+            <a:extLst>
+              <a:ext uri="{FF2B5EF4-FFF2-40B4-BE49-F238E27FC236}">
+                <a16:creationId xmlns:a16="http://schemas.microsoft.com/office/drawing/2014/main" id="{3398EE65-C316-4645-84FD-ADCA57880866}"/>
+              </a:ext>
+            </a:extLst>
+          </p:cNvPr>
+          <p:cNvPicPr>
+            <a:picLocks noChangeAspect="1"/>
+          </p:cNvPicPr>
+          <p:nvPr/>
+        </p:nvPicPr>
+        <p:blipFill>
+          <a:blip r:embed="rId2"/>
+          <a:stretch>
+            <a:fillRect/>
+          </a:stretch>
+        </p:blipFill>
+        <p:spPr>
+          <a:xfrm>
+            <a:off x="289957" y="1753498"/>
+            <a:ext cx="6449543" cy="3537594"/>
+          </a:xfrm>
+          <a:prstGeom prst="rect">
+            <a:avLst/>
+          </a:prstGeom>
+        </p:spPr>
+      </p:pic>
     </p:spTree>
     <p:extLst>
       <p:ext uri="{BB962C8B-B14F-4D97-AF65-F5344CB8AC3E}">
         <p14:creationId xmlns:p14="http://schemas.microsoft.com/office/powerpoint/2010/main" val="148411955"/>
+      </p:ext>
+    </p:extLst>
+  </p:cSld>
+  <p:clrMapOvr>
+    <a:masterClrMapping/>
+  </p:clrMapOvr>
+</p:sld>
+</file>
+
+<file path=ppt/slides/slide9.xml><?xml version="1.0" encoding="utf-8"?>
+<p:sld xmlns:a="http://schemas.openxmlformats.org/drawingml/2006/main" xmlns:r="http://schemas.openxmlformats.org/officeDocument/2006/relationships" xmlns:p="http://schemas.openxmlformats.org/presentationml/2006/main">
+  <p:cSld>
+    <p:spTree>
+      <p:nvGrpSpPr>
+        <p:cNvPr id="1" name=""/>
+        <p:cNvGrpSpPr/>
+        <p:nvPr/>
+      </p:nvGrpSpPr>
+      <p:grpSpPr>
+        <a:xfrm>
+          <a:off x="0" y="0"/>
+          <a:ext cx="0" cy="0"/>
+          <a:chOff x="0" y="0"/>
+          <a:chExt cx="0" cy="0"/>
+        </a:xfrm>
+      </p:grpSpPr>
+      <p:sp>
+        <p:nvSpPr>
+          <p:cNvPr id="2" name="제목 1">
+            <a:extLst>
+              <a:ext uri="{FF2B5EF4-FFF2-40B4-BE49-F238E27FC236}">
+                <a16:creationId xmlns:a16="http://schemas.microsoft.com/office/drawing/2014/main" id="{2EC833C6-FAC3-442B-803D-3FB02DF07980}"/>
+              </a:ext>
+            </a:extLst>
+          </p:cNvPr>
+          <p:cNvSpPr>
+            <a:spLocks noGrp="1"/>
+          </p:cNvSpPr>
+          <p:nvPr>
+            <p:ph type="title"/>
+          </p:nvPr>
+        </p:nvSpPr>
+        <p:spPr>
+          <a:xfrm>
+            <a:off x="677334" y="609600"/>
+            <a:ext cx="8596668" cy="517864"/>
+          </a:xfrm>
+        </p:spPr>
+        <p:txBody>
+          <a:bodyPr>
+            <a:normAutofit fontScale="90000"/>
+          </a:bodyPr>
+          <a:lstStyle/>
+          <a:p>
+            <a:r>
+              <a:rPr lang="en-US" altLang="ko-KR" dirty="0"/>
+              <a:t>7. User Account and Profile Picture</a:t>
+            </a:r>
+            <a:endParaRPr lang="ko-KR" altLang="en-US" dirty="0"/>
+          </a:p>
+        </p:txBody>
+      </p:sp>
+      <p:sp>
+        <p:nvSpPr>
+          <p:cNvPr id="6" name="직사각형 5">
+            <a:extLst>
+              <a:ext uri="{FF2B5EF4-FFF2-40B4-BE49-F238E27FC236}">
+                <a16:creationId xmlns:a16="http://schemas.microsoft.com/office/drawing/2014/main" id="{6A60F032-B172-43E0-B147-16329887DE8F}"/>
+              </a:ext>
+            </a:extLst>
+          </p:cNvPr>
+          <p:cNvSpPr/>
+          <p:nvPr/>
+        </p:nvSpPr>
+        <p:spPr>
+          <a:xfrm>
+            <a:off x="7620874" y="2196693"/>
+            <a:ext cx="4470512" cy="1384995"/>
+          </a:xfrm>
+          <a:prstGeom prst="rect">
+            <a:avLst/>
+          </a:prstGeom>
+        </p:spPr>
+        <p:txBody>
+          <a:bodyPr wrap="square">
+            <a:spAutoFit/>
+          </a:bodyPr>
+          <a:lstStyle/>
+          <a:p>
+            <a:pPr marL="285750" indent="-285750">
+              <a:buFontTx/>
+              <a:buChar char="-"/>
+            </a:pPr>
+            <a:r>
+              <a:rPr lang="en-US" altLang="ko-KR" sz="1400" dirty="0" err="1"/>
+              <a:t>WTForms</a:t>
+            </a:r>
+            <a:r>
+              <a:rPr lang="ko-KR" altLang="en-US" sz="1400" dirty="0"/>
+              <a:t>로 작업할 때 </a:t>
+            </a:r>
+            <a:r>
+              <a:rPr lang="en-US" altLang="ko-KR" sz="1400" dirty="0"/>
+              <a:t>class</a:t>
+            </a:r>
+            <a:r>
+              <a:rPr lang="ko-KR" altLang="en-US" sz="1400" dirty="0"/>
+              <a:t>로 먼저 그 </a:t>
+            </a:r>
+            <a:r>
+              <a:rPr lang="en-US" altLang="ko-KR" sz="1400" dirty="0"/>
+              <a:t>forms</a:t>
+            </a:r>
+            <a:r>
+              <a:rPr lang="ko-KR" altLang="en-US" sz="1400" dirty="0"/>
+              <a:t>을 정의 </a:t>
+            </a:r>
+            <a:r>
+              <a:rPr lang="ko-KR" altLang="en-US" sz="1400" dirty="0" err="1"/>
+              <a:t>해야한다</a:t>
+            </a:r>
+            <a:r>
+              <a:rPr lang="en-US" altLang="ko-KR" sz="1400" dirty="0"/>
+              <a:t>.</a:t>
+            </a:r>
+          </a:p>
+          <a:p>
+            <a:pPr marL="285750" indent="-285750">
+              <a:buFontTx/>
+              <a:buChar char="-"/>
+            </a:pPr>
+            <a:r>
+              <a:rPr lang="ko-KR" altLang="en-US" sz="1400" dirty="0"/>
+              <a:t>어플리케이션을 여러 모듈로 쪼개고 </a:t>
+            </a:r>
+            <a:r>
+              <a:rPr lang="en-US" altLang="ko-KR" sz="1400" dirty="0"/>
+              <a:t>form</a:t>
+            </a:r>
+            <a:r>
+              <a:rPr lang="ko-KR" altLang="en-US" sz="1400" dirty="0"/>
+              <a:t>에 대한 분리된 모듈을 추가하는 것이 권고된다</a:t>
+            </a:r>
+            <a:r>
+              <a:rPr lang="en-US" altLang="ko-KR" sz="1400" dirty="0"/>
+              <a:t>.</a:t>
+            </a:r>
+          </a:p>
+          <a:p>
+            <a:endParaRPr lang="en-US" altLang="ko-KR" sz="1400" dirty="0"/>
+          </a:p>
+          <a:p>
+            <a:endParaRPr lang="en-US" altLang="ko-KR" sz="1400" dirty="0"/>
+          </a:p>
+        </p:txBody>
+      </p:sp>
+      <p:sp>
+        <p:nvSpPr>
+          <p:cNvPr id="7" name="제목 1">
+            <a:extLst>
+              <a:ext uri="{FF2B5EF4-FFF2-40B4-BE49-F238E27FC236}">
+                <a16:creationId xmlns:a16="http://schemas.microsoft.com/office/drawing/2014/main" id="{453FF060-58F0-4366-9AA1-883792CE5955}"/>
+              </a:ext>
+            </a:extLst>
+          </p:cNvPr>
+          <p:cNvSpPr txBox="1">
+            <a:spLocks/>
+          </p:cNvSpPr>
+          <p:nvPr/>
+        </p:nvSpPr>
+        <p:spPr>
+          <a:xfrm>
+            <a:off x="1109177" y="1144214"/>
+            <a:ext cx="7768494" cy="517864"/>
+          </a:xfrm>
+          <a:prstGeom prst="rect">
+            <a:avLst/>
+          </a:prstGeom>
+        </p:spPr>
+        <p:txBody>
+          <a:bodyPr vert="horz" lIns="91440" tIns="45720" rIns="91440" bIns="45720" rtlCol="0" anchor="t">
+            <a:normAutofit fontScale="45000" lnSpcReduction="20000"/>
+          </a:bodyPr>
+          <a:lstStyle>
+            <a:lvl1pPr algn="l" defTabSz="457200" rtl="0" eaLnBrk="1" latinLnBrk="1" hangingPunct="1">
+              <a:spcBef>
+                <a:spcPct val="0"/>
+              </a:spcBef>
+              <a:buNone/>
+              <a:defRPr sz="3600" kern="1200">
+                <a:solidFill>
+                  <a:schemeClr val="accent1"/>
+                </a:solidFill>
+                <a:latin typeface="+mj-lt"/>
+                <a:ea typeface="+mj-ea"/>
+                <a:cs typeface="+mj-cs"/>
+              </a:defRPr>
+            </a:lvl1pPr>
+            <a:lvl2pPr eaLnBrk="1" latinLnBrk="1" hangingPunct="1">
+              <a:defRPr>
+                <a:solidFill>
+                  <a:schemeClr val="tx2"/>
+                </a:solidFill>
+              </a:defRPr>
+            </a:lvl2pPr>
+            <a:lvl3pPr eaLnBrk="1" latinLnBrk="1" hangingPunct="1">
+              <a:defRPr>
+                <a:solidFill>
+                  <a:schemeClr val="tx2"/>
+                </a:solidFill>
+              </a:defRPr>
+            </a:lvl3pPr>
+            <a:lvl4pPr eaLnBrk="1" latinLnBrk="1" hangingPunct="1">
+              <a:defRPr>
+                <a:solidFill>
+                  <a:schemeClr val="tx2"/>
+                </a:solidFill>
+              </a:defRPr>
+            </a:lvl4pPr>
+            <a:lvl5pPr eaLnBrk="1" latinLnBrk="1" hangingPunct="1">
+              <a:defRPr>
+                <a:solidFill>
+                  <a:schemeClr val="tx2"/>
+                </a:solidFill>
+              </a:defRPr>
+            </a:lvl5pPr>
+            <a:lvl6pPr eaLnBrk="1" latinLnBrk="1" hangingPunct="1">
+              <a:defRPr>
+                <a:solidFill>
+                  <a:schemeClr val="tx2"/>
+                </a:solidFill>
+              </a:defRPr>
+            </a:lvl6pPr>
+            <a:lvl7pPr eaLnBrk="1" latinLnBrk="1" hangingPunct="1">
+              <a:defRPr>
+                <a:solidFill>
+                  <a:schemeClr val="tx2"/>
+                </a:solidFill>
+              </a:defRPr>
+            </a:lvl7pPr>
+            <a:lvl8pPr eaLnBrk="1" latinLnBrk="1" hangingPunct="1">
+              <a:defRPr>
+                <a:solidFill>
+                  <a:schemeClr val="tx2"/>
+                </a:solidFill>
+              </a:defRPr>
+            </a:lvl8pPr>
+            <a:lvl9pPr eaLnBrk="1" latinLnBrk="1" hangingPunct="1">
+              <a:defRPr>
+                <a:solidFill>
+                  <a:schemeClr val="tx2"/>
+                </a:solidFill>
+              </a:defRPr>
+            </a:lvl9pPr>
+          </a:lstStyle>
+          <a:p>
+            <a:endParaRPr lang="en-US" altLang="ko-KR" dirty="0"/>
+          </a:p>
+          <a:p>
+            <a:r>
+              <a:rPr lang="en-US" altLang="ko-KR" dirty="0" err="1"/>
+              <a:t>login.htlm</a:t>
+            </a:r>
+            <a:endParaRPr lang="ko-KR" altLang="en-US" dirty="0"/>
+          </a:p>
+        </p:txBody>
+      </p:sp>
+      <p:pic>
+        <p:nvPicPr>
+          <p:cNvPr id="4" name="그림 3">
+            <a:extLst>
+              <a:ext uri="{FF2B5EF4-FFF2-40B4-BE49-F238E27FC236}">
+                <a16:creationId xmlns:a16="http://schemas.microsoft.com/office/drawing/2014/main" id="{464BEF89-D176-45DB-9A20-CACB8EC02B2D}"/>
+              </a:ext>
+            </a:extLst>
+          </p:cNvPr>
+          <p:cNvPicPr>
+            <a:picLocks noChangeAspect="1"/>
+          </p:cNvPicPr>
+          <p:nvPr/>
+        </p:nvPicPr>
+        <p:blipFill>
+          <a:blip r:embed="rId2"/>
+          <a:stretch>
+            <a:fillRect/>
+          </a:stretch>
+        </p:blipFill>
+        <p:spPr>
+          <a:xfrm>
+            <a:off x="307219" y="1662078"/>
+            <a:ext cx="5788781" cy="4935136"/>
+          </a:xfrm>
+          <a:prstGeom prst="rect">
+            <a:avLst/>
+          </a:prstGeom>
+        </p:spPr>
+      </p:pic>
+    </p:spTree>
+    <p:extLst>
+      <p:ext uri="{BB962C8B-B14F-4D97-AF65-F5344CB8AC3E}">
+        <p14:creationId xmlns:p14="http://schemas.microsoft.com/office/powerpoint/2010/main" val="1211973556"/>
       </p:ext>
     </p:extLst>
   </p:cSld>

</xml_diff>